<commit_message>
added timeout, added portrait layout
</commit_message>
<xml_diff>
--- a/Background Creator.pptx
+++ b/Background Creator.pptx
@@ -2,18 +2,18 @@
 <file path=ppt/presentation.xml><?xml version="1.0" encoding="utf-8"?>
 <p:presentation xmlns:a="http://schemas.openxmlformats.org/drawingml/2006/main" xmlns:r="http://schemas.openxmlformats.org/officeDocument/2006/relationships" xmlns:p="http://schemas.openxmlformats.org/presentationml/2006/main" saveSubsetFonts="1">
   <p:sldMasterIdLst>
-    <p:sldMasterId id="2147483804" r:id="rId1"/>
+    <p:sldMasterId id="2147483816" r:id="rId1"/>
   </p:sldMasterIdLst>
   <p:sldIdLst>
     <p:sldId id="256" r:id="rId2"/>
   </p:sldIdLst>
-  <p:sldSz cx="18562638" cy="10515600"/>
+  <p:sldSz cx="10515600" cy="18562638"/>
   <p:notesSz cx="6858000" cy="9144000"/>
   <p:defaultTextStyle>
     <a:defPPr>
       <a:defRPr lang="en-US"/>
     </a:defPPr>
-    <a:lvl1pPr marL="0" algn="l" defTabSz="1157809" rtl="0" eaLnBrk="1" latinLnBrk="0" hangingPunct="1">
+    <a:lvl1pPr marL="0" algn="l" defTabSz="1157751" rtl="0" eaLnBrk="1" latinLnBrk="0" hangingPunct="1">
       <a:defRPr sz="2279" kern="1200">
         <a:solidFill>
           <a:schemeClr val="tx1"/>
@@ -23,7 +23,7 @@
         <a:cs typeface="+mn-cs"/>
       </a:defRPr>
     </a:lvl1pPr>
-    <a:lvl2pPr marL="578905" algn="l" defTabSz="1157809" rtl="0" eaLnBrk="1" latinLnBrk="0" hangingPunct="1">
+    <a:lvl2pPr marL="578875" algn="l" defTabSz="1157751" rtl="0" eaLnBrk="1" latinLnBrk="0" hangingPunct="1">
       <a:defRPr sz="2279" kern="1200">
         <a:solidFill>
           <a:schemeClr val="tx1"/>
@@ -33,7 +33,7 @@
         <a:cs typeface="+mn-cs"/>
       </a:defRPr>
     </a:lvl2pPr>
-    <a:lvl3pPr marL="1157809" algn="l" defTabSz="1157809" rtl="0" eaLnBrk="1" latinLnBrk="0" hangingPunct="1">
+    <a:lvl3pPr marL="1157751" algn="l" defTabSz="1157751" rtl="0" eaLnBrk="1" latinLnBrk="0" hangingPunct="1">
       <a:defRPr sz="2279" kern="1200">
         <a:solidFill>
           <a:schemeClr val="tx1"/>
@@ -43,7 +43,7 @@
         <a:cs typeface="+mn-cs"/>
       </a:defRPr>
     </a:lvl3pPr>
-    <a:lvl4pPr marL="1736712" algn="l" defTabSz="1157809" rtl="0" eaLnBrk="1" latinLnBrk="0" hangingPunct="1">
+    <a:lvl4pPr marL="1736626" algn="l" defTabSz="1157751" rtl="0" eaLnBrk="1" latinLnBrk="0" hangingPunct="1">
       <a:defRPr sz="2279" kern="1200">
         <a:solidFill>
           <a:schemeClr val="tx1"/>
@@ -53,7 +53,7 @@
         <a:cs typeface="+mn-cs"/>
       </a:defRPr>
     </a:lvl4pPr>
-    <a:lvl5pPr marL="2315615" algn="l" defTabSz="1157809" rtl="0" eaLnBrk="1" latinLnBrk="0" hangingPunct="1">
+    <a:lvl5pPr marL="2315500" algn="l" defTabSz="1157751" rtl="0" eaLnBrk="1" latinLnBrk="0" hangingPunct="1">
       <a:defRPr sz="2279" kern="1200">
         <a:solidFill>
           <a:schemeClr val="tx1"/>
@@ -63,7 +63,7 @@
         <a:cs typeface="+mn-cs"/>
       </a:defRPr>
     </a:lvl5pPr>
-    <a:lvl6pPr marL="2894520" algn="l" defTabSz="1157809" rtl="0" eaLnBrk="1" latinLnBrk="0" hangingPunct="1">
+    <a:lvl6pPr marL="2894375" algn="l" defTabSz="1157751" rtl="0" eaLnBrk="1" latinLnBrk="0" hangingPunct="1">
       <a:defRPr sz="2279" kern="1200">
         <a:solidFill>
           <a:schemeClr val="tx1"/>
@@ -73,7 +73,7 @@
         <a:cs typeface="+mn-cs"/>
       </a:defRPr>
     </a:lvl6pPr>
-    <a:lvl7pPr marL="3473424" algn="l" defTabSz="1157809" rtl="0" eaLnBrk="1" latinLnBrk="0" hangingPunct="1">
+    <a:lvl7pPr marL="3473250" algn="l" defTabSz="1157751" rtl="0" eaLnBrk="1" latinLnBrk="0" hangingPunct="1">
       <a:defRPr sz="2279" kern="1200">
         <a:solidFill>
           <a:schemeClr val="tx1"/>
@@ -83,7 +83,7 @@
         <a:cs typeface="+mn-cs"/>
       </a:defRPr>
     </a:lvl7pPr>
-    <a:lvl8pPr marL="4052328" algn="l" defTabSz="1157809" rtl="0" eaLnBrk="1" latinLnBrk="0" hangingPunct="1">
+    <a:lvl8pPr marL="4052126" algn="l" defTabSz="1157751" rtl="0" eaLnBrk="1" latinLnBrk="0" hangingPunct="1">
       <a:defRPr sz="2279" kern="1200">
         <a:solidFill>
           <a:schemeClr val="tx1"/>
@@ -93,7 +93,7 @@
         <a:cs typeface="+mn-cs"/>
       </a:defRPr>
     </a:lvl8pPr>
-    <a:lvl9pPr marL="4631231" algn="l" defTabSz="1157809" rtl="0" eaLnBrk="1" latinLnBrk="0" hangingPunct="1">
+    <a:lvl9pPr marL="4630999" algn="l" defTabSz="1157751" rtl="0" eaLnBrk="1" latinLnBrk="0" hangingPunct="1">
       <a:defRPr sz="2279" kern="1200">
         <a:solidFill>
           <a:schemeClr val="tx1"/>
@@ -104,6 +104,11 @@
       </a:defRPr>
     </a:lvl9pPr>
   </p:defaultTextStyle>
+  <p:extLst>
+    <p:ext uri="{EFAFB233-063F-42B5-8137-9DF3F51BA10A}">
+      <p15:sldGuideLst xmlns:p15="http://schemas.microsoft.com/office/powerpoint/2012/main"/>
+    </p:ext>
+  </p:extLst>
 </p:presentation>
 </file>
 
@@ -136,15 +141,15 @@
         </p:nvSpPr>
         <p:spPr>
           <a:xfrm>
-            <a:off x="2320330" y="1720956"/>
-            <a:ext cx="13921979" cy="3660987"/>
+            <a:off x="788670" y="3037915"/>
+            <a:ext cx="8938260" cy="6462548"/>
           </a:xfrm>
         </p:spPr>
         <p:txBody>
           <a:bodyPr anchor="b"/>
           <a:lstStyle>
             <a:lvl1pPr algn="ctr">
-              <a:defRPr sz="9135"/>
+              <a:defRPr sz="6900"/>
             </a:lvl1pPr>
           </a:lstStyle>
           <a:p>
@@ -168,8 +173,8 @@
         </p:nvSpPr>
         <p:spPr>
           <a:xfrm>
-            <a:off x="2320330" y="5523125"/>
-            <a:ext cx="13921979" cy="2538835"/>
+            <a:off x="1314450" y="9749683"/>
+            <a:ext cx="7886700" cy="4481673"/>
           </a:xfrm>
         </p:spPr>
         <p:txBody>
@@ -177,39 +182,39 @@
           <a:lstStyle>
             <a:lvl1pPr marL="0" indent="0" algn="ctr">
               <a:buNone/>
-              <a:defRPr sz="3654"/>
+              <a:defRPr sz="2760"/>
             </a:lvl1pPr>
-            <a:lvl2pPr marL="696087" indent="0" algn="ctr">
-              <a:buNone/>
-              <a:defRPr sz="3045"/>
+            <a:lvl2pPr marL="525780" indent="0" algn="ctr">
+              <a:buNone/>
+              <a:defRPr sz="2300"/>
             </a:lvl2pPr>
-            <a:lvl3pPr marL="1392174" indent="0" algn="ctr">
-              <a:buNone/>
-              <a:defRPr sz="2741"/>
+            <a:lvl3pPr marL="1051560" indent="0" algn="ctr">
+              <a:buNone/>
+              <a:defRPr sz="2070"/>
             </a:lvl3pPr>
-            <a:lvl4pPr marL="2088261" indent="0" algn="ctr">
-              <a:buNone/>
-              <a:defRPr sz="2436"/>
+            <a:lvl4pPr marL="1577340" indent="0" algn="ctr">
+              <a:buNone/>
+              <a:defRPr sz="1840"/>
             </a:lvl4pPr>
-            <a:lvl5pPr marL="2784348" indent="0" algn="ctr">
-              <a:buNone/>
-              <a:defRPr sz="2436"/>
+            <a:lvl5pPr marL="2103120" indent="0" algn="ctr">
+              <a:buNone/>
+              <a:defRPr sz="1840"/>
             </a:lvl5pPr>
-            <a:lvl6pPr marL="3480435" indent="0" algn="ctr">
-              <a:buNone/>
-              <a:defRPr sz="2436"/>
+            <a:lvl6pPr marL="2628900" indent="0" algn="ctr">
+              <a:buNone/>
+              <a:defRPr sz="1840"/>
             </a:lvl6pPr>
-            <a:lvl7pPr marL="4176522" indent="0" algn="ctr">
-              <a:buNone/>
-              <a:defRPr sz="2436"/>
+            <a:lvl7pPr marL="3154680" indent="0" algn="ctr">
+              <a:buNone/>
+              <a:defRPr sz="1840"/>
             </a:lvl7pPr>
-            <a:lvl8pPr marL="4872609" indent="0" algn="ctr">
-              <a:buNone/>
-              <a:defRPr sz="2436"/>
+            <a:lvl8pPr marL="3680460" indent="0" algn="ctr">
+              <a:buNone/>
+              <a:defRPr sz="1840"/>
             </a:lvl8pPr>
-            <a:lvl9pPr marL="5568696" indent="0" algn="ctr">
-              <a:buNone/>
-              <a:defRPr sz="2436"/>
+            <a:lvl9pPr marL="4206240" indent="0" algn="ctr">
+              <a:buNone/>
+              <a:defRPr sz="1840"/>
             </a:lvl9pPr>
           </a:lstStyle>
           <a:p>
@@ -238,7 +243,7 @@
           <a:p>
             <a:fld id="{B8513C00-EA50-43F5-8BD2-BB1AC7D70113}" type="datetimeFigureOut">
               <a:rPr lang="en-US" smtClean="0"/>
-              <a:t>9/12/2016</a:t>
+              <a:t>1/5/2017</a:t>
             </a:fld>
             <a:endParaRPr lang="en-US"/>
           </a:p>
@@ -289,7 +294,7 @@
     </p:spTree>
     <p:extLst>
       <p:ext uri="{BB962C8B-B14F-4D97-AF65-F5344CB8AC3E}">
-        <p14:creationId xmlns:p14="http://schemas.microsoft.com/office/powerpoint/2010/main" val="3053289694"/>
+        <p14:creationId xmlns:p14="http://schemas.microsoft.com/office/powerpoint/2010/main" val="2508915779"/>
       </p:ext>
     </p:extLst>
   </p:cSld>
@@ -408,7 +413,7 @@
           <a:p>
             <a:fld id="{B8513C00-EA50-43F5-8BD2-BB1AC7D70113}" type="datetimeFigureOut">
               <a:rPr lang="en-US" smtClean="0"/>
-              <a:t>9/12/2016</a:t>
+              <a:t>1/5/2017</a:t>
             </a:fld>
             <a:endParaRPr lang="en-US"/>
           </a:p>
@@ -459,7 +464,7 @@
     </p:spTree>
     <p:extLst>
       <p:ext uri="{BB962C8B-B14F-4D97-AF65-F5344CB8AC3E}">
-        <p14:creationId xmlns:p14="http://schemas.microsoft.com/office/powerpoint/2010/main" val="222327131"/>
+        <p14:creationId xmlns:p14="http://schemas.microsoft.com/office/powerpoint/2010/main" val="4167361293"/>
       </p:ext>
     </p:extLst>
   </p:cSld>
@@ -498,8 +503,8 @@
         </p:nvSpPr>
         <p:spPr>
           <a:xfrm>
-            <a:off x="13283888" y="559858"/>
-            <a:ext cx="4002569" cy="8911485"/>
+            <a:off x="7525227" y="988288"/>
+            <a:ext cx="2267426" cy="15730978"/>
           </a:xfrm>
         </p:spPr>
         <p:txBody>
@@ -526,8 +531,8 @@
         </p:nvSpPr>
         <p:spPr>
           <a:xfrm>
-            <a:off x="1276182" y="559858"/>
-            <a:ext cx="11775673" cy="8911485"/>
+            <a:off x="722948" y="988288"/>
+            <a:ext cx="6670834" cy="15730978"/>
           </a:xfrm>
         </p:spPr>
         <p:txBody>
@@ -588,7 +593,7 @@
           <a:p>
             <a:fld id="{B8513C00-EA50-43F5-8BD2-BB1AC7D70113}" type="datetimeFigureOut">
               <a:rPr lang="en-US" smtClean="0"/>
-              <a:t>9/12/2016</a:t>
+              <a:t>1/5/2017</a:t>
             </a:fld>
             <a:endParaRPr lang="en-US"/>
           </a:p>
@@ -639,7 +644,7 @@
     </p:spTree>
     <p:extLst>
       <p:ext uri="{BB962C8B-B14F-4D97-AF65-F5344CB8AC3E}">
-        <p14:creationId xmlns:p14="http://schemas.microsoft.com/office/powerpoint/2010/main" val="2891927864"/>
+        <p14:creationId xmlns:p14="http://schemas.microsoft.com/office/powerpoint/2010/main" val="2799099547"/>
       </p:ext>
     </p:extLst>
   </p:cSld>
@@ -758,7 +763,7 @@
           <a:p>
             <a:fld id="{B8513C00-EA50-43F5-8BD2-BB1AC7D70113}" type="datetimeFigureOut">
               <a:rPr lang="en-US" smtClean="0"/>
-              <a:t>9/12/2016</a:t>
+              <a:t>1/5/2017</a:t>
             </a:fld>
             <a:endParaRPr lang="en-US"/>
           </a:p>
@@ -809,7 +814,7 @@
     </p:spTree>
     <p:extLst>
       <p:ext uri="{BB962C8B-B14F-4D97-AF65-F5344CB8AC3E}">
-        <p14:creationId xmlns:p14="http://schemas.microsoft.com/office/powerpoint/2010/main" val="1479231206"/>
+        <p14:creationId xmlns:p14="http://schemas.microsoft.com/office/powerpoint/2010/main" val="2696832192"/>
       </p:ext>
     </p:extLst>
   </p:cSld>
@@ -848,15 +853,15 @@
         </p:nvSpPr>
         <p:spPr>
           <a:xfrm>
-            <a:off x="1266513" y="2621599"/>
-            <a:ext cx="16010275" cy="4374197"/>
+            <a:off x="717471" y="4627774"/>
+            <a:ext cx="9069705" cy="7721540"/>
           </a:xfrm>
         </p:spPr>
         <p:txBody>
           <a:bodyPr anchor="b"/>
           <a:lstStyle>
             <a:lvl1pPr>
-              <a:defRPr sz="9135"/>
+              <a:defRPr sz="6900"/>
             </a:lvl1pPr>
           </a:lstStyle>
           <a:p>
@@ -880,8 +885,8 @@
         </p:nvSpPr>
         <p:spPr>
           <a:xfrm>
-            <a:off x="1266513" y="7037177"/>
-            <a:ext cx="16010275" cy="2300287"/>
+            <a:off x="717471" y="12422363"/>
+            <a:ext cx="9069705" cy="4060576"/>
           </a:xfrm>
         </p:spPr>
         <p:txBody>
@@ -889,17 +894,15 @@
           <a:lstStyle>
             <a:lvl1pPr marL="0" indent="0">
               <a:buNone/>
-              <a:defRPr sz="3654">
+              <a:defRPr sz="2760">
                 <a:solidFill>
-                  <a:schemeClr val="tx1">
-                    <a:tint val="75000"/>
-                  </a:schemeClr>
+                  <a:schemeClr val="tx1"/>
                 </a:solidFill>
               </a:defRPr>
             </a:lvl1pPr>
-            <a:lvl2pPr marL="696087" indent="0">
-              <a:buNone/>
-              <a:defRPr sz="3045">
+            <a:lvl2pPr marL="525780" indent="0">
+              <a:buNone/>
+              <a:defRPr sz="2300">
                 <a:solidFill>
                   <a:schemeClr val="tx1">
                     <a:tint val="75000"/>
@@ -907,9 +910,9 @@
                 </a:solidFill>
               </a:defRPr>
             </a:lvl2pPr>
-            <a:lvl3pPr marL="1392174" indent="0">
-              <a:buNone/>
-              <a:defRPr sz="2741">
+            <a:lvl3pPr marL="1051560" indent="0">
+              <a:buNone/>
+              <a:defRPr sz="2070">
                 <a:solidFill>
                   <a:schemeClr val="tx1">
                     <a:tint val="75000"/>
@@ -917,9 +920,9 @@
                 </a:solidFill>
               </a:defRPr>
             </a:lvl3pPr>
-            <a:lvl4pPr marL="2088261" indent="0">
-              <a:buNone/>
-              <a:defRPr sz="2436">
+            <a:lvl4pPr marL="1577340" indent="0">
+              <a:buNone/>
+              <a:defRPr sz="1840">
                 <a:solidFill>
                   <a:schemeClr val="tx1">
                     <a:tint val="75000"/>
@@ -927,9 +930,9 @@
                 </a:solidFill>
               </a:defRPr>
             </a:lvl4pPr>
-            <a:lvl5pPr marL="2784348" indent="0">
-              <a:buNone/>
-              <a:defRPr sz="2436">
+            <a:lvl5pPr marL="2103120" indent="0">
+              <a:buNone/>
+              <a:defRPr sz="1840">
                 <a:solidFill>
                   <a:schemeClr val="tx1">
                     <a:tint val="75000"/>
@@ -937,9 +940,9 @@
                 </a:solidFill>
               </a:defRPr>
             </a:lvl5pPr>
-            <a:lvl6pPr marL="3480435" indent="0">
-              <a:buNone/>
-              <a:defRPr sz="2436">
+            <a:lvl6pPr marL="2628900" indent="0">
+              <a:buNone/>
+              <a:defRPr sz="1840">
                 <a:solidFill>
                   <a:schemeClr val="tx1">
                     <a:tint val="75000"/>
@@ -947,9 +950,9 @@
                 </a:solidFill>
               </a:defRPr>
             </a:lvl6pPr>
-            <a:lvl7pPr marL="4176522" indent="0">
-              <a:buNone/>
-              <a:defRPr sz="2436">
+            <a:lvl7pPr marL="3154680" indent="0">
+              <a:buNone/>
+              <a:defRPr sz="1840">
                 <a:solidFill>
                   <a:schemeClr val="tx1">
                     <a:tint val="75000"/>
@@ -957,9 +960,9 @@
                 </a:solidFill>
               </a:defRPr>
             </a:lvl7pPr>
-            <a:lvl8pPr marL="4872609" indent="0">
-              <a:buNone/>
-              <a:defRPr sz="2436">
+            <a:lvl8pPr marL="3680460" indent="0">
+              <a:buNone/>
+              <a:defRPr sz="1840">
                 <a:solidFill>
                   <a:schemeClr val="tx1">
                     <a:tint val="75000"/>
@@ -967,9 +970,9 @@
                 </a:solidFill>
               </a:defRPr>
             </a:lvl8pPr>
-            <a:lvl9pPr marL="5568696" indent="0">
-              <a:buNone/>
-              <a:defRPr sz="2436">
+            <a:lvl9pPr marL="4206240" indent="0">
+              <a:buNone/>
+              <a:defRPr sz="1840">
                 <a:solidFill>
                   <a:schemeClr val="tx1">
                     <a:tint val="75000"/>
@@ -1004,7 +1007,7 @@
           <a:p>
             <a:fld id="{B8513C00-EA50-43F5-8BD2-BB1AC7D70113}" type="datetimeFigureOut">
               <a:rPr lang="en-US" smtClean="0"/>
-              <a:t>9/12/2016</a:t>
+              <a:t>1/5/2017</a:t>
             </a:fld>
             <a:endParaRPr lang="en-US"/>
           </a:p>
@@ -1055,7 +1058,7 @@
     </p:spTree>
     <p:extLst>
       <p:ext uri="{BB962C8B-B14F-4D97-AF65-F5344CB8AC3E}">
-        <p14:creationId xmlns:p14="http://schemas.microsoft.com/office/powerpoint/2010/main" val="3331665601"/>
+        <p14:creationId xmlns:p14="http://schemas.microsoft.com/office/powerpoint/2010/main" val="2509831690"/>
       </p:ext>
     </p:extLst>
   </p:cSld>
@@ -1117,8 +1120,8 @@
         </p:nvSpPr>
         <p:spPr>
           <a:xfrm>
-            <a:off x="1276181" y="2799291"/>
-            <a:ext cx="7889121" cy="6672052"/>
+            <a:off x="722948" y="4941443"/>
+            <a:ext cx="4469130" cy="11777823"/>
           </a:xfrm>
         </p:spPr>
         <p:txBody>
@@ -1174,8 +1177,8 @@
         </p:nvSpPr>
         <p:spPr>
           <a:xfrm>
-            <a:off x="9397336" y="2799291"/>
-            <a:ext cx="7889121" cy="6672052"/>
+            <a:off x="5323523" y="4941443"/>
+            <a:ext cx="4469130" cy="11777823"/>
           </a:xfrm>
         </p:spPr>
         <p:txBody>
@@ -1236,7 +1239,7 @@
           <a:p>
             <a:fld id="{B8513C00-EA50-43F5-8BD2-BB1AC7D70113}" type="datetimeFigureOut">
               <a:rPr lang="en-US" smtClean="0"/>
-              <a:t>9/12/2016</a:t>
+              <a:t>1/5/2017</a:t>
             </a:fld>
             <a:endParaRPr lang="en-US"/>
           </a:p>
@@ -1287,7 +1290,7 @@
     </p:spTree>
     <p:extLst>
       <p:ext uri="{BB962C8B-B14F-4D97-AF65-F5344CB8AC3E}">
-        <p14:creationId xmlns:p14="http://schemas.microsoft.com/office/powerpoint/2010/main" val="545592144"/>
+        <p14:creationId xmlns:p14="http://schemas.microsoft.com/office/powerpoint/2010/main" val="3722510688"/>
       </p:ext>
     </p:extLst>
   </p:cSld>
@@ -1326,8 +1329,8 @@
         </p:nvSpPr>
         <p:spPr>
           <a:xfrm>
-            <a:off x="1278599" y="559859"/>
-            <a:ext cx="16010275" cy="2032530"/>
+            <a:off x="724317" y="988292"/>
+            <a:ext cx="9069705" cy="3587919"/>
           </a:xfrm>
         </p:spPr>
         <p:txBody>
@@ -1354,8 +1357,8 @@
         </p:nvSpPr>
         <p:spPr>
           <a:xfrm>
-            <a:off x="1278600" y="2577783"/>
-            <a:ext cx="7852865" cy="1263332"/>
+            <a:off x="724318" y="4550426"/>
+            <a:ext cx="4448591" cy="2230093"/>
           </a:xfrm>
         </p:spPr>
         <p:txBody>
@@ -1363,39 +1366,39 @@
           <a:lstStyle>
             <a:lvl1pPr marL="0" indent="0">
               <a:buNone/>
-              <a:defRPr sz="3654" b="1"/>
+              <a:defRPr sz="2760" b="1"/>
             </a:lvl1pPr>
-            <a:lvl2pPr marL="696087" indent="0">
-              <a:buNone/>
-              <a:defRPr sz="3045" b="1"/>
+            <a:lvl2pPr marL="525780" indent="0">
+              <a:buNone/>
+              <a:defRPr sz="2300" b="1"/>
             </a:lvl2pPr>
-            <a:lvl3pPr marL="1392174" indent="0">
-              <a:buNone/>
-              <a:defRPr sz="2741" b="1"/>
+            <a:lvl3pPr marL="1051560" indent="0">
+              <a:buNone/>
+              <a:defRPr sz="2070" b="1"/>
             </a:lvl3pPr>
-            <a:lvl4pPr marL="2088261" indent="0">
-              <a:buNone/>
-              <a:defRPr sz="2436" b="1"/>
+            <a:lvl4pPr marL="1577340" indent="0">
+              <a:buNone/>
+              <a:defRPr sz="1840" b="1"/>
             </a:lvl4pPr>
-            <a:lvl5pPr marL="2784348" indent="0">
-              <a:buNone/>
-              <a:defRPr sz="2436" b="1"/>
+            <a:lvl5pPr marL="2103120" indent="0">
+              <a:buNone/>
+              <a:defRPr sz="1840" b="1"/>
             </a:lvl5pPr>
-            <a:lvl6pPr marL="3480435" indent="0">
-              <a:buNone/>
-              <a:defRPr sz="2436" b="1"/>
+            <a:lvl6pPr marL="2628900" indent="0">
+              <a:buNone/>
+              <a:defRPr sz="1840" b="1"/>
             </a:lvl6pPr>
-            <a:lvl7pPr marL="4176522" indent="0">
-              <a:buNone/>
-              <a:defRPr sz="2436" b="1"/>
+            <a:lvl7pPr marL="3154680" indent="0">
+              <a:buNone/>
+              <a:defRPr sz="1840" b="1"/>
             </a:lvl7pPr>
-            <a:lvl8pPr marL="4872609" indent="0">
-              <a:buNone/>
-              <a:defRPr sz="2436" b="1"/>
+            <a:lvl8pPr marL="3680460" indent="0">
+              <a:buNone/>
+              <a:defRPr sz="1840" b="1"/>
             </a:lvl8pPr>
-            <a:lvl9pPr marL="5568696" indent="0">
-              <a:buNone/>
-              <a:defRPr sz="2436" b="1"/>
+            <a:lvl9pPr marL="4206240" indent="0">
+              <a:buNone/>
+              <a:defRPr sz="1840" b="1"/>
             </a:lvl9pPr>
           </a:lstStyle>
           <a:p>
@@ -1419,8 +1422,8 @@
         </p:nvSpPr>
         <p:spPr>
           <a:xfrm>
-            <a:off x="1278600" y="3841115"/>
-            <a:ext cx="7852865" cy="5649702"/>
+            <a:off x="724318" y="6780519"/>
+            <a:ext cx="4448591" cy="9973122"/>
           </a:xfrm>
         </p:spPr>
         <p:txBody>
@@ -1476,8 +1479,8 @@
         </p:nvSpPr>
         <p:spPr>
           <a:xfrm>
-            <a:off x="9397335" y="2577783"/>
-            <a:ext cx="7891539" cy="1263332"/>
+            <a:off x="5323523" y="4550426"/>
+            <a:ext cx="4470500" cy="2230093"/>
           </a:xfrm>
         </p:spPr>
         <p:txBody>
@@ -1485,39 +1488,39 @@
           <a:lstStyle>
             <a:lvl1pPr marL="0" indent="0">
               <a:buNone/>
-              <a:defRPr sz="3654" b="1"/>
+              <a:defRPr sz="2760" b="1"/>
             </a:lvl1pPr>
-            <a:lvl2pPr marL="696087" indent="0">
-              <a:buNone/>
-              <a:defRPr sz="3045" b="1"/>
+            <a:lvl2pPr marL="525780" indent="0">
+              <a:buNone/>
+              <a:defRPr sz="2300" b="1"/>
             </a:lvl2pPr>
-            <a:lvl3pPr marL="1392174" indent="0">
-              <a:buNone/>
-              <a:defRPr sz="2741" b="1"/>
+            <a:lvl3pPr marL="1051560" indent="0">
+              <a:buNone/>
+              <a:defRPr sz="2070" b="1"/>
             </a:lvl3pPr>
-            <a:lvl4pPr marL="2088261" indent="0">
-              <a:buNone/>
-              <a:defRPr sz="2436" b="1"/>
+            <a:lvl4pPr marL="1577340" indent="0">
+              <a:buNone/>
+              <a:defRPr sz="1840" b="1"/>
             </a:lvl4pPr>
-            <a:lvl5pPr marL="2784348" indent="0">
-              <a:buNone/>
-              <a:defRPr sz="2436" b="1"/>
+            <a:lvl5pPr marL="2103120" indent="0">
+              <a:buNone/>
+              <a:defRPr sz="1840" b="1"/>
             </a:lvl5pPr>
-            <a:lvl6pPr marL="3480435" indent="0">
-              <a:buNone/>
-              <a:defRPr sz="2436" b="1"/>
+            <a:lvl6pPr marL="2628900" indent="0">
+              <a:buNone/>
+              <a:defRPr sz="1840" b="1"/>
             </a:lvl6pPr>
-            <a:lvl7pPr marL="4176522" indent="0">
-              <a:buNone/>
-              <a:defRPr sz="2436" b="1"/>
+            <a:lvl7pPr marL="3154680" indent="0">
+              <a:buNone/>
+              <a:defRPr sz="1840" b="1"/>
             </a:lvl7pPr>
-            <a:lvl8pPr marL="4872609" indent="0">
-              <a:buNone/>
-              <a:defRPr sz="2436" b="1"/>
+            <a:lvl8pPr marL="3680460" indent="0">
+              <a:buNone/>
+              <a:defRPr sz="1840" b="1"/>
             </a:lvl8pPr>
-            <a:lvl9pPr marL="5568696" indent="0">
-              <a:buNone/>
-              <a:defRPr sz="2436" b="1"/>
+            <a:lvl9pPr marL="4206240" indent="0">
+              <a:buNone/>
+              <a:defRPr sz="1840" b="1"/>
             </a:lvl9pPr>
           </a:lstStyle>
           <a:p>
@@ -1541,8 +1544,8 @@
         </p:nvSpPr>
         <p:spPr>
           <a:xfrm>
-            <a:off x="9397335" y="3841115"/>
-            <a:ext cx="7891539" cy="5649702"/>
+            <a:off x="5323523" y="6780519"/>
+            <a:ext cx="4470500" cy="9973122"/>
           </a:xfrm>
         </p:spPr>
         <p:txBody>
@@ -1603,7 +1606,7 @@
           <a:p>
             <a:fld id="{B8513C00-EA50-43F5-8BD2-BB1AC7D70113}" type="datetimeFigureOut">
               <a:rPr lang="en-US" smtClean="0"/>
-              <a:t>9/12/2016</a:t>
+              <a:t>1/5/2017</a:t>
             </a:fld>
             <a:endParaRPr lang="en-US"/>
           </a:p>
@@ -1654,7 +1657,7 @@
     </p:spTree>
     <p:extLst>
       <p:ext uri="{BB962C8B-B14F-4D97-AF65-F5344CB8AC3E}">
-        <p14:creationId xmlns:p14="http://schemas.microsoft.com/office/powerpoint/2010/main" val="2811037978"/>
+        <p14:creationId xmlns:p14="http://schemas.microsoft.com/office/powerpoint/2010/main" val="1339929762"/>
       </p:ext>
     </p:extLst>
   </p:cSld>
@@ -1721,7 +1724,7 @@
           <a:p>
             <a:fld id="{B8513C00-EA50-43F5-8BD2-BB1AC7D70113}" type="datetimeFigureOut">
               <a:rPr lang="en-US" smtClean="0"/>
-              <a:t>9/12/2016</a:t>
+              <a:t>1/5/2017</a:t>
             </a:fld>
             <a:endParaRPr lang="en-US"/>
           </a:p>
@@ -1772,7 +1775,7 @@
     </p:spTree>
     <p:extLst>
       <p:ext uri="{BB962C8B-B14F-4D97-AF65-F5344CB8AC3E}">
-        <p14:creationId xmlns:p14="http://schemas.microsoft.com/office/powerpoint/2010/main" val="1240038465"/>
+        <p14:creationId xmlns:p14="http://schemas.microsoft.com/office/powerpoint/2010/main" val="3541698462"/>
       </p:ext>
     </p:extLst>
   </p:cSld>
@@ -1816,7 +1819,7 @@
           <a:p>
             <a:fld id="{B8513C00-EA50-43F5-8BD2-BB1AC7D70113}" type="datetimeFigureOut">
               <a:rPr lang="en-US" smtClean="0"/>
-              <a:t>9/12/2016</a:t>
+              <a:t>1/5/2017</a:t>
             </a:fld>
             <a:endParaRPr lang="en-US"/>
           </a:p>
@@ -1867,7 +1870,7 @@
     </p:spTree>
     <p:extLst>
       <p:ext uri="{BB962C8B-B14F-4D97-AF65-F5344CB8AC3E}">
-        <p14:creationId xmlns:p14="http://schemas.microsoft.com/office/powerpoint/2010/main" val="2368746536"/>
+        <p14:creationId xmlns:p14="http://schemas.microsoft.com/office/powerpoint/2010/main" val="153700282"/>
       </p:ext>
     </p:extLst>
   </p:cSld>
@@ -1906,15 +1909,15 @@
         </p:nvSpPr>
         <p:spPr>
           <a:xfrm>
-            <a:off x="1278600" y="701040"/>
-            <a:ext cx="5986933" cy="2453640"/>
+            <a:off x="724317" y="1237509"/>
+            <a:ext cx="3391555" cy="4331282"/>
           </a:xfrm>
         </p:spPr>
         <p:txBody>
           <a:bodyPr anchor="b"/>
           <a:lstStyle>
             <a:lvl1pPr>
-              <a:defRPr sz="4872"/>
+              <a:defRPr sz="3680"/>
             </a:lvl1pPr>
           </a:lstStyle>
           <a:p>
@@ -1938,39 +1941,39 @@
         </p:nvSpPr>
         <p:spPr>
           <a:xfrm>
-            <a:off x="7891539" y="1514052"/>
-            <a:ext cx="9397335" cy="7472892"/>
+            <a:off x="4470499" y="2672680"/>
+            <a:ext cx="5323523" cy="13191504"/>
           </a:xfrm>
         </p:spPr>
         <p:txBody>
           <a:bodyPr/>
           <a:lstStyle>
             <a:lvl1pPr>
-              <a:defRPr sz="4872"/>
+              <a:defRPr sz="3680"/>
             </a:lvl1pPr>
             <a:lvl2pPr>
-              <a:defRPr sz="4263"/>
+              <a:defRPr sz="3220"/>
             </a:lvl2pPr>
             <a:lvl3pPr>
-              <a:defRPr sz="3654"/>
+              <a:defRPr sz="2760"/>
             </a:lvl3pPr>
             <a:lvl4pPr>
-              <a:defRPr sz="3045"/>
+              <a:defRPr sz="2300"/>
             </a:lvl4pPr>
             <a:lvl5pPr>
-              <a:defRPr sz="3045"/>
+              <a:defRPr sz="2300"/>
             </a:lvl5pPr>
             <a:lvl6pPr>
-              <a:defRPr sz="3045"/>
+              <a:defRPr sz="2300"/>
             </a:lvl6pPr>
             <a:lvl7pPr>
-              <a:defRPr sz="3045"/>
+              <a:defRPr sz="2300"/>
             </a:lvl7pPr>
             <a:lvl8pPr>
-              <a:defRPr sz="3045"/>
+              <a:defRPr sz="2300"/>
             </a:lvl8pPr>
             <a:lvl9pPr>
-              <a:defRPr sz="3045"/>
+              <a:defRPr sz="2300"/>
             </a:lvl9pPr>
           </a:lstStyle>
           <a:p>
@@ -2023,8 +2026,8 @@
         </p:nvSpPr>
         <p:spPr>
           <a:xfrm>
-            <a:off x="1278600" y="3154680"/>
-            <a:ext cx="5986933" cy="5844435"/>
+            <a:off x="724317" y="5568791"/>
+            <a:ext cx="3391555" cy="10316875"/>
           </a:xfrm>
         </p:spPr>
         <p:txBody>
@@ -2032,39 +2035,39 @@
           <a:lstStyle>
             <a:lvl1pPr marL="0" indent="0">
               <a:buNone/>
-              <a:defRPr sz="2436"/>
+              <a:defRPr sz="1840"/>
             </a:lvl1pPr>
-            <a:lvl2pPr marL="696087" indent="0">
-              <a:buNone/>
-              <a:defRPr sz="2132"/>
+            <a:lvl2pPr marL="525780" indent="0">
+              <a:buNone/>
+              <a:defRPr sz="1610"/>
             </a:lvl2pPr>
-            <a:lvl3pPr marL="1392174" indent="0">
-              <a:buNone/>
-              <a:defRPr sz="1827"/>
+            <a:lvl3pPr marL="1051560" indent="0">
+              <a:buNone/>
+              <a:defRPr sz="1380"/>
             </a:lvl3pPr>
-            <a:lvl4pPr marL="2088261" indent="0">
-              <a:buNone/>
-              <a:defRPr sz="1523"/>
+            <a:lvl4pPr marL="1577340" indent="0">
+              <a:buNone/>
+              <a:defRPr sz="1150"/>
             </a:lvl4pPr>
-            <a:lvl5pPr marL="2784348" indent="0">
-              <a:buNone/>
-              <a:defRPr sz="1523"/>
+            <a:lvl5pPr marL="2103120" indent="0">
+              <a:buNone/>
+              <a:defRPr sz="1150"/>
             </a:lvl5pPr>
-            <a:lvl6pPr marL="3480435" indent="0">
-              <a:buNone/>
-              <a:defRPr sz="1523"/>
+            <a:lvl6pPr marL="2628900" indent="0">
+              <a:buNone/>
+              <a:defRPr sz="1150"/>
             </a:lvl6pPr>
-            <a:lvl7pPr marL="4176522" indent="0">
-              <a:buNone/>
-              <a:defRPr sz="1523"/>
+            <a:lvl7pPr marL="3154680" indent="0">
+              <a:buNone/>
+              <a:defRPr sz="1150"/>
             </a:lvl7pPr>
-            <a:lvl8pPr marL="4872609" indent="0">
-              <a:buNone/>
-              <a:defRPr sz="1523"/>
+            <a:lvl8pPr marL="3680460" indent="0">
+              <a:buNone/>
+              <a:defRPr sz="1150"/>
             </a:lvl8pPr>
-            <a:lvl9pPr marL="5568696" indent="0">
-              <a:buNone/>
-              <a:defRPr sz="1523"/>
+            <a:lvl9pPr marL="4206240" indent="0">
+              <a:buNone/>
+              <a:defRPr sz="1150"/>
             </a:lvl9pPr>
           </a:lstStyle>
           <a:p>
@@ -2093,7 +2096,7 @@
           <a:p>
             <a:fld id="{B8513C00-EA50-43F5-8BD2-BB1AC7D70113}" type="datetimeFigureOut">
               <a:rPr lang="en-US" smtClean="0"/>
-              <a:t>9/12/2016</a:t>
+              <a:t>1/5/2017</a:t>
             </a:fld>
             <a:endParaRPr lang="en-US"/>
           </a:p>
@@ -2144,7 +2147,7 @@
     </p:spTree>
     <p:extLst>
       <p:ext uri="{BB962C8B-B14F-4D97-AF65-F5344CB8AC3E}">
-        <p14:creationId xmlns:p14="http://schemas.microsoft.com/office/powerpoint/2010/main" val="3857121879"/>
+        <p14:creationId xmlns:p14="http://schemas.microsoft.com/office/powerpoint/2010/main" val="2413207881"/>
       </p:ext>
     </p:extLst>
   </p:cSld>
@@ -2183,15 +2186,15 @@
         </p:nvSpPr>
         <p:spPr>
           <a:xfrm>
-            <a:off x="1278600" y="701040"/>
-            <a:ext cx="5986933" cy="2453640"/>
+            <a:off x="724317" y="1237509"/>
+            <a:ext cx="3391555" cy="4331282"/>
           </a:xfrm>
         </p:spPr>
         <p:txBody>
           <a:bodyPr anchor="b"/>
           <a:lstStyle>
             <a:lvl1pPr>
-              <a:defRPr sz="4872"/>
+              <a:defRPr sz="3680"/>
             </a:lvl1pPr>
           </a:lstStyle>
           <a:p>
@@ -2215,8 +2218,8 @@
         </p:nvSpPr>
         <p:spPr>
           <a:xfrm>
-            <a:off x="7891539" y="1514052"/>
-            <a:ext cx="9397335" cy="7472892"/>
+            <a:off x="4470499" y="2672680"/>
+            <a:ext cx="5323523" cy="13191504"/>
           </a:xfrm>
         </p:spPr>
         <p:txBody>
@@ -2224,39 +2227,39 @@
           <a:lstStyle>
             <a:lvl1pPr marL="0" indent="0">
               <a:buNone/>
-              <a:defRPr sz="4872"/>
+              <a:defRPr sz="3680"/>
             </a:lvl1pPr>
-            <a:lvl2pPr marL="696087" indent="0">
-              <a:buNone/>
-              <a:defRPr sz="4263"/>
+            <a:lvl2pPr marL="525780" indent="0">
+              <a:buNone/>
+              <a:defRPr sz="3220"/>
             </a:lvl2pPr>
-            <a:lvl3pPr marL="1392174" indent="0">
-              <a:buNone/>
-              <a:defRPr sz="3654"/>
+            <a:lvl3pPr marL="1051560" indent="0">
+              <a:buNone/>
+              <a:defRPr sz="2760"/>
             </a:lvl3pPr>
-            <a:lvl4pPr marL="2088261" indent="0">
-              <a:buNone/>
-              <a:defRPr sz="3045"/>
+            <a:lvl4pPr marL="1577340" indent="0">
+              <a:buNone/>
+              <a:defRPr sz="2300"/>
             </a:lvl4pPr>
-            <a:lvl5pPr marL="2784348" indent="0">
-              <a:buNone/>
-              <a:defRPr sz="3045"/>
+            <a:lvl5pPr marL="2103120" indent="0">
+              <a:buNone/>
+              <a:defRPr sz="2300"/>
             </a:lvl5pPr>
-            <a:lvl6pPr marL="3480435" indent="0">
-              <a:buNone/>
-              <a:defRPr sz="3045"/>
+            <a:lvl6pPr marL="2628900" indent="0">
+              <a:buNone/>
+              <a:defRPr sz="2300"/>
             </a:lvl6pPr>
-            <a:lvl7pPr marL="4176522" indent="0">
-              <a:buNone/>
-              <a:defRPr sz="3045"/>
+            <a:lvl7pPr marL="3154680" indent="0">
+              <a:buNone/>
+              <a:defRPr sz="2300"/>
             </a:lvl7pPr>
-            <a:lvl8pPr marL="4872609" indent="0">
-              <a:buNone/>
-              <a:defRPr sz="3045"/>
+            <a:lvl8pPr marL="3680460" indent="0">
+              <a:buNone/>
+              <a:defRPr sz="2300"/>
             </a:lvl8pPr>
-            <a:lvl9pPr marL="5568696" indent="0">
-              <a:buNone/>
-              <a:defRPr sz="3045"/>
+            <a:lvl9pPr marL="4206240" indent="0">
+              <a:buNone/>
+              <a:defRPr sz="2300"/>
             </a:lvl9pPr>
           </a:lstStyle>
           <a:p>
@@ -2280,8 +2283,8 @@
         </p:nvSpPr>
         <p:spPr>
           <a:xfrm>
-            <a:off x="1278600" y="3154680"/>
-            <a:ext cx="5986933" cy="5844435"/>
+            <a:off x="724317" y="5568791"/>
+            <a:ext cx="3391555" cy="10316875"/>
           </a:xfrm>
         </p:spPr>
         <p:txBody>
@@ -2289,39 +2292,39 @@
           <a:lstStyle>
             <a:lvl1pPr marL="0" indent="0">
               <a:buNone/>
-              <a:defRPr sz="2436"/>
+              <a:defRPr sz="1840"/>
             </a:lvl1pPr>
-            <a:lvl2pPr marL="696087" indent="0">
-              <a:buNone/>
-              <a:defRPr sz="2132"/>
+            <a:lvl2pPr marL="525780" indent="0">
+              <a:buNone/>
+              <a:defRPr sz="1610"/>
             </a:lvl2pPr>
-            <a:lvl3pPr marL="1392174" indent="0">
-              <a:buNone/>
-              <a:defRPr sz="1827"/>
+            <a:lvl3pPr marL="1051560" indent="0">
+              <a:buNone/>
+              <a:defRPr sz="1380"/>
             </a:lvl3pPr>
-            <a:lvl4pPr marL="2088261" indent="0">
-              <a:buNone/>
-              <a:defRPr sz="1523"/>
+            <a:lvl4pPr marL="1577340" indent="0">
+              <a:buNone/>
+              <a:defRPr sz="1150"/>
             </a:lvl4pPr>
-            <a:lvl5pPr marL="2784348" indent="0">
-              <a:buNone/>
-              <a:defRPr sz="1523"/>
+            <a:lvl5pPr marL="2103120" indent="0">
+              <a:buNone/>
+              <a:defRPr sz="1150"/>
             </a:lvl5pPr>
-            <a:lvl6pPr marL="3480435" indent="0">
-              <a:buNone/>
-              <a:defRPr sz="1523"/>
+            <a:lvl6pPr marL="2628900" indent="0">
+              <a:buNone/>
+              <a:defRPr sz="1150"/>
             </a:lvl6pPr>
-            <a:lvl7pPr marL="4176522" indent="0">
-              <a:buNone/>
-              <a:defRPr sz="1523"/>
+            <a:lvl7pPr marL="3154680" indent="0">
+              <a:buNone/>
+              <a:defRPr sz="1150"/>
             </a:lvl7pPr>
-            <a:lvl8pPr marL="4872609" indent="0">
-              <a:buNone/>
-              <a:defRPr sz="1523"/>
+            <a:lvl8pPr marL="3680460" indent="0">
+              <a:buNone/>
+              <a:defRPr sz="1150"/>
             </a:lvl8pPr>
-            <a:lvl9pPr marL="5568696" indent="0">
-              <a:buNone/>
-              <a:defRPr sz="1523"/>
+            <a:lvl9pPr marL="4206240" indent="0">
+              <a:buNone/>
+              <a:defRPr sz="1150"/>
             </a:lvl9pPr>
           </a:lstStyle>
           <a:p>
@@ -2350,7 +2353,7 @@
           <a:p>
             <a:fld id="{B8513C00-EA50-43F5-8BD2-BB1AC7D70113}" type="datetimeFigureOut">
               <a:rPr lang="en-US" smtClean="0"/>
-              <a:t>9/12/2016</a:t>
+              <a:t>1/5/2017</a:t>
             </a:fld>
             <a:endParaRPr lang="en-US"/>
           </a:p>
@@ -2401,7 +2404,7 @@
     </p:spTree>
     <p:extLst>
       <p:ext uri="{BB962C8B-B14F-4D97-AF65-F5344CB8AC3E}">
-        <p14:creationId xmlns:p14="http://schemas.microsoft.com/office/powerpoint/2010/main" val="3391974373"/>
+        <p14:creationId xmlns:p14="http://schemas.microsoft.com/office/powerpoint/2010/main" val="1096938256"/>
       </p:ext>
     </p:extLst>
   </p:cSld>
@@ -2445,8 +2448,8 @@
         </p:nvSpPr>
         <p:spPr>
           <a:xfrm>
-            <a:off x="1276182" y="559859"/>
-            <a:ext cx="16010275" cy="2032530"/>
+            <a:off x="722948" y="988292"/>
+            <a:ext cx="9069705" cy="3587919"/>
           </a:xfrm>
           <a:prstGeom prst="rect">
             <a:avLst/>
@@ -2478,8 +2481,8 @@
         </p:nvSpPr>
         <p:spPr>
           <a:xfrm>
-            <a:off x="1276182" y="2799291"/>
-            <a:ext cx="16010275" cy="6672052"/>
+            <a:off x="722948" y="4941443"/>
+            <a:ext cx="9069705" cy="11777823"/>
           </a:xfrm>
           <a:prstGeom prst="rect">
             <a:avLst/>
@@ -2540,8 +2543,8 @@
         </p:nvSpPr>
         <p:spPr>
           <a:xfrm>
-            <a:off x="1276181" y="9746404"/>
-            <a:ext cx="4176594" cy="559858"/>
+            <a:off x="722948" y="17204819"/>
+            <a:ext cx="2366010" cy="988289"/>
           </a:xfrm>
           <a:prstGeom prst="rect">
             <a:avLst/>
@@ -2551,7 +2554,7 @@
           <a:bodyPr vert="horz" lIns="91440" tIns="45720" rIns="91440" bIns="45720" rtlCol="0" anchor="ctr"/>
           <a:lstStyle>
             <a:lvl1pPr algn="l">
-              <a:defRPr sz="1827">
+              <a:defRPr sz="1380">
                 <a:solidFill>
                   <a:schemeClr val="tx1">
                     <a:tint val="75000"/>
@@ -2563,7 +2566,7 @@
           <a:p>
             <a:fld id="{B8513C00-EA50-43F5-8BD2-BB1AC7D70113}" type="datetimeFigureOut">
               <a:rPr lang="en-US" smtClean="0"/>
-              <a:t>9/12/2016</a:t>
+              <a:t>1/5/2017</a:t>
             </a:fld>
             <a:endParaRPr lang="en-US"/>
           </a:p>
@@ -2581,8 +2584,8 @@
         </p:nvSpPr>
         <p:spPr>
           <a:xfrm>
-            <a:off x="6148874" y="9746404"/>
-            <a:ext cx="6264890" cy="559858"/>
+            <a:off x="3483293" y="17204819"/>
+            <a:ext cx="3549015" cy="988289"/>
           </a:xfrm>
           <a:prstGeom prst="rect">
             <a:avLst/>
@@ -2592,7 +2595,7 @@
           <a:bodyPr vert="horz" lIns="91440" tIns="45720" rIns="91440" bIns="45720" rtlCol="0" anchor="ctr"/>
           <a:lstStyle>
             <a:lvl1pPr algn="ctr">
-              <a:defRPr sz="1827">
+              <a:defRPr sz="1380">
                 <a:solidFill>
                   <a:schemeClr val="tx1">
                     <a:tint val="75000"/>
@@ -2618,8 +2621,8 @@
         </p:nvSpPr>
         <p:spPr>
           <a:xfrm>
-            <a:off x="13109863" y="9746404"/>
-            <a:ext cx="4176594" cy="559858"/>
+            <a:off x="7426643" y="17204819"/>
+            <a:ext cx="2366010" cy="988289"/>
           </a:xfrm>
           <a:prstGeom prst="rect">
             <a:avLst/>
@@ -2629,7 +2632,7 @@
           <a:bodyPr vert="horz" lIns="91440" tIns="45720" rIns="91440" bIns="45720" rtlCol="0" anchor="ctr"/>
           <a:lstStyle>
             <a:lvl1pPr algn="r">
-              <a:defRPr sz="1827">
+              <a:defRPr sz="1380">
                 <a:solidFill>
                   <a:schemeClr val="tx1">
                     <a:tint val="75000"/>
@@ -2650,27 +2653,27 @@
     </p:spTree>
     <p:extLst>
       <p:ext uri="{BB962C8B-B14F-4D97-AF65-F5344CB8AC3E}">
-        <p14:creationId xmlns:p14="http://schemas.microsoft.com/office/powerpoint/2010/main" val="3407566666"/>
+        <p14:creationId xmlns:p14="http://schemas.microsoft.com/office/powerpoint/2010/main" val="1786263181"/>
       </p:ext>
     </p:extLst>
   </p:cSld>
   <p:clrMap bg1="lt1" tx1="dk1" bg2="lt2" tx2="dk2" accent1="accent1" accent2="accent2" accent3="accent3" accent4="accent4" accent5="accent5" accent6="accent6" hlink="hlink" folHlink="folHlink"/>
   <p:sldLayoutIdLst>
-    <p:sldLayoutId id="2147483805" r:id="rId1"/>
-    <p:sldLayoutId id="2147483806" r:id="rId2"/>
-    <p:sldLayoutId id="2147483807" r:id="rId3"/>
-    <p:sldLayoutId id="2147483808" r:id="rId4"/>
-    <p:sldLayoutId id="2147483809" r:id="rId5"/>
-    <p:sldLayoutId id="2147483810" r:id="rId6"/>
-    <p:sldLayoutId id="2147483811" r:id="rId7"/>
-    <p:sldLayoutId id="2147483812" r:id="rId8"/>
-    <p:sldLayoutId id="2147483813" r:id="rId9"/>
-    <p:sldLayoutId id="2147483814" r:id="rId10"/>
-    <p:sldLayoutId id="2147483815" r:id="rId11"/>
+    <p:sldLayoutId id="2147483817" r:id="rId1"/>
+    <p:sldLayoutId id="2147483818" r:id="rId2"/>
+    <p:sldLayoutId id="2147483819" r:id="rId3"/>
+    <p:sldLayoutId id="2147483820" r:id="rId4"/>
+    <p:sldLayoutId id="2147483821" r:id="rId5"/>
+    <p:sldLayoutId id="2147483822" r:id="rId6"/>
+    <p:sldLayoutId id="2147483823" r:id="rId7"/>
+    <p:sldLayoutId id="2147483824" r:id="rId8"/>
+    <p:sldLayoutId id="2147483825" r:id="rId9"/>
+    <p:sldLayoutId id="2147483826" r:id="rId10"/>
+    <p:sldLayoutId id="2147483827" r:id="rId11"/>
   </p:sldLayoutIdLst>
   <p:txStyles>
     <p:titleStyle>
-      <a:lvl1pPr algn="l" defTabSz="1392174" rtl="0" eaLnBrk="1" latinLnBrk="0" hangingPunct="1">
+      <a:lvl1pPr algn="l" defTabSz="1051560" rtl="0" eaLnBrk="1" latinLnBrk="0" hangingPunct="1">
         <a:lnSpc>
           <a:spcPct val="90000"/>
         </a:lnSpc>
@@ -2678,7 +2681,7 @@
           <a:spcPct val="0"/>
         </a:spcBef>
         <a:buNone/>
-        <a:defRPr sz="6699" kern="1200">
+        <a:defRPr sz="5060" kern="1200">
           <a:solidFill>
             <a:schemeClr val="tx1"/>
           </a:solidFill>
@@ -2689,16 +2692,16 @@
       </a:lvl1pPr>
     </p:titleStyle>
     <p:bodyStyle>
-      <a:lvl1pPr marL="348044" indent="-348044" algn="l" defTabSz="1392174" rtl="0" eaLnBrk="1" latinLnBrk="0" hangingPunct="1">
+      <a:lvl1pPr marL="262890" indent="-262890" algn="l" defTabSz="1051560" rtl="0" eaLnBrk="1" latinLnBrk="0" hangingPunct="1">
         <a:lnSpc>
           <a:spcPct val="90000"/>
         </a:lnSpc>
         <a:spcBef>
-          <a:spcPts val="1523"/>
+          <a:spcPts val="1150"/>
         </a:spcBef>
         <a:buFont typeface="Arial" panose="020B0604020202020204" pitchFamily="34" charset="0"/>
         <a:buChar char="•"/>
-        <a:defRPr sz="4263" kern="1200">
+        <a:defRPr sz="3220" kern="1200">
           <a:solidFill>
             <a:schemeClr val="tx1"/>
           </a:solidFill>
@@ -2707,16 +2710,16 @@
           <a:cs typeface="+mn-cs"/>
         </a:defRPr>
       </a:lvl1pPr>
-      <a:lvl2pPr marL="1044131" indent="-348044" algn="l" defTabSz="1392174" rtl="0" eaLnBrk="1" latinLnBrk="0" hangingPunct="1">
+      <a:lvl2pPr marL="788670" indent="-262890" algn="l" defTabSz="1051560" rtl="0" eaLnBrk="1" latinLnBrk="0" hangingPunct="1">
         <a:lnSpc>
           <a:spcPct val="90000"/>
         </a:lnSpc>
         <a:spcBef>
-          <a:spcPts val="761"/>
+          <a:spcPts val="575"/>
         </a:spcBef>
         <a:buFont typeface="Arial" panose="020B0604020202020204" pitchFamily="34" charset="0"/>
         <a:buChar char="•"/>
-        <a:defRPr sz="3654" kern="1200">
+        <a:defRPr sz="2760" kern="1200">
           <a:solidFill>
             <a:schemeClr val="tx1"/>
           </a:solidFill>
@@ -2725,16 +2728,16 @@
           <a:cs typeface="+mn-cs"/>
         </a:defRPr>
       </a:lvl2pPr>
-      <a:lvl3pPr marL="1740218" indent="-348044" algn="l" defTabSz="1392174" rtl="0" eaLnBrk="1" latinLnBrk="0" hangingPunct="1">
+      <a:lvl3pPr marL="1314450" indent="-262890" algn="l" defTabSz="1051560" rtl="0" eaLnBrk="1" latinLnBrk="0" hangingPunct="1">
         <a:lnSpc>
           <a:spcPct val="90000"/>
         </a:lnSpc>
         <a:spcBef>
-          <a:spcPts val="761"/>
+          <a:spcPts val="575"/>
         </a:spcBef>
         <a:buFont typeface="Arial" panose="020B0604020202020204" pitchFamily="34" charset="0"/>
         <a:buChar char="•"/>
-        <a:defRPr sz="3045" kern="1200">
+        <a:defRPr sz="2300" kern="1200">
           <a:solidFill>
             <a:schemeClr val="tx1"/>
           </a:solidFill>
@@ -2743,16 +2746,16 @@
           <a:cs typeface="+mn-cs"/>
         </a:defRPr>
       </a:lvl3pPr>
-      <a:lvl4pPr marL="2436305" indent="-348044" algn="l" defTabSz="1392174" rtl="0" eaLnBrk="1" latinLnBrk="0" hangingPunct="1">
+      <a:lvl4pPr marL="1840230" indent="-262890" algn="l" defTabSz="1051560" rtl="0" eaLnBrk="1" latinLnBrk="0" hangingPunct="1">
         <a:lnSpc>
           <a:spcPct val="90000"/>
         </a:lnSpc>
         <a:spcBef>
-          <a:spcPts val="761"/>
+          <a:spcPts val="575"/>
         </a:spcBef>
         <a:buFont typeface="Arial" panose="020B0604020202020204" pitchFamily="34" charset="0"/>
         <a:buChar char="•"/>
-        <a:defRPr sz="2741" kern="1200">
+        <a:defRPr sz="2070" kern="1200">
           <a:solidFill>
             <a:schemeClr val="tx1"/>
           </a:solidFill>
@@ -2761,16 +2764,16 @@
           <a:cs typeface="+mn-cs"/>
         </a:defRPr>
       </a:lvl4pPr>
-      <a:lvl5pPr marL="3132392" indent="-348044" algn="l" defTabSz="1392174" rtl="0" eaLnBrk="1" latinLnBrk="0" hangingPunct="1">
+      <a:lvl5pPr marL="2366010" indent="-262890" algn="l" defTabSz="1051560" rtl="0" eaLnBrk="1" latinLnBrk="0" hangingPunct="1">
         <a:lnSpc>
           <a:spcPct val="90000"/>
         </a:lnSpc>
         <a:spcBef>
-          <a:spcPts val="761"/>
+          <a:spcPts val="575"/>
         </a:spcBef>
         <a:buFont typeface="Arial" panose="020B0604020202020204" pitchFamily="34" charset="0"/>
         <a:buChar char="•"/>
-        <a:defRPr sz="2741" kern="1200">
+        <a:defRPr sz="2070" kern="1200">
           <a:solidFill>
             <a:schemeClr val="tx1"/>
           </a:solidFill>
@@ -2779,16 +2782,16 @@
           <a:cs typeface="+mn-cs"/>
         </a:defRPr>
       </a:lvl5pPr>
-      <a:lvl6pPr marL="3828479" indent="-348044" algn="l" defTabSz="1392174" rtl="0" eaLnBrk="1" latinLnBrk="0" hangingPunct="1">
+      <a:lvl6pPr marL="2891790" indent="-262890" algn="l" defTabSz="1051560" rtl="0" eaLnBrk="1" latinLnBrk="0" hangingPunct="1">
         <a:lnSpc>
           <a:spcPct val="90000"/>
         </a:lnSpc>
         <a:spcBef>
-          <a:spcPts val="761"/>
+          <a:spcPts val="575"/>
         </a:spcBef>
         <a:buFont typeface="Arial" panose="020B0604020202020204" pitchFamily="34" charset="0"/>
         <a:buChar char="•"/>
-        <a:defRPr sz="2741" kern="1200">
+        <a:defRPr sz="2070" kern="1200">
           <a:solidFill>
             <a:schemeClr val="tx1"/>
           </a:solidFill>
@@ -2797,16 +2800,16 @@
           <a:cs typeface="+mn-cs"/>
         </a:defRPr>
       </a:lvl6pPr>
-      <a:lvl7pPr marL="4524566" indent="-348044" algn="l" defTabSz="1392174" rtl="0" eaLnBrk="1" latinLnBrk="0" hangingPunct="1">
+      <a:lvl7pPr marL="3417570" indent="-262890" algn="l" defTabSz="1051560" rtl="0" eaLnBrk="1" latinLnBrk="0" hangingPunct="1">
         <a:lnSpc>
           <a:spcPct val="90000"/>
         </a:lnSpc>
         <a:spcBef>
-          <a:spcPts val="761"/>
+          <a:spcPts val="575"/>
         </a:spcBef>
         <a:buFont typeface="Arial" panose="020B0604020202020204" pitchFamily="34" charset="0"/>
         <a:buChar char="•"/>
-        <a:defRPr sz="2741" kern="1200">
+        <a:defRPr sz="2070" kern="1200">
           <a:solidFill>
             <a:schemeClr val="tx1"/>
           </a:solidFill>
@@ -2815,16 +2818,16 @@
           <a:cs typeface="+mn-cs"/>
         </a:defRPr>
       </a:lvl7pPr>
-      <a:lvl8pPr marL="5220653" indent="-348044" algn="l" defTabSz="1392174" rtl="0" eaLnBrk="1" latinLnBrk="0" hangingPunct="1">
+      <a:lvl8pPr marL="3943350" indent="-262890" algn="l" defTabSz="1051560" rtl="0" eaLnBrk="1" latinLnBrk="0" hangingPunct="1">
         <a:lnSpc>
           <a:spcPct val="90000"/>
         </a:lnSpc>
         <a:spcBef>
-          <a:spcPts val="761"/>
+          <a:spcPts val="575"/>
         </a:spcBef>
         <a:buFont typeface="Arial" panose="020B0604020202020204" pitchFamily="34" charset="0"/>
         <a:buChar char="•"/>
-        <a:defRPr sz="2741" kern="1200">
+        <a:defRPr sz="2070" kern="1200">
           <a:solidFill>
             <a:schemeClr val="tx1"/>
           </a:solidFill>
@@ -2833,16 +2836,16 @@
           <a:cs typeface="+mn-cs"/>
         </a:defRPr>
       </a:lvl8pPr>
-      <a:lvl9pPr marL="5916740" indent="-348044" algn="l" defTabSz="1392174" rtl="0" eaLnBrk="1" latinLnBrk="0" hangingPunct="1">
+      <a:lvl9pPr marL="4469130" indent="-262890" algn="l" defTabSz="1051560" rtl="0" eaLnBrk="1" latinLnBrk="0" hangingPunct="1">
         <a:lnSpc>
           <a:spcPct val="90000"/>
         </a:lnSpc>
         <a:spcBef>
-          <a:spcPts val="761"/>
+          <a:spcPts val="575"/>
         </a:spcBef>
         <a:buFont typeface="Arial" panose="020B0604020202020204" pitchFamily="34" charset="0"/>
         <a:buChar char="•"/>
-        <a:defRPr sz="2741" kern="1200">
+        <a:defRPr sz="2070" kern="1200">
           <a:solidFill>
             <a:schemeClr val="tx1"/>
           </a:solidFill>
@@ -2856,8 +2859,8 @@
       <a:defPPr>
         <a:defRPr lang="en-US"/>
       </a:defPPr>
-      <a:lvl1pPr marL="0" algn="l" defTabSz="1392174" rtl="0" eaLnBrk="1" latinLnBrk="0" hangingPunct="1">
-        <a:defRPr sz="2741" kern="1200">
+      <a:lvl1pPr marL="0" algn="l" defTabSz="1051560" rtl="0" eaLnBrk="1" latinLnBrk="0" hangingPunct="1">
+        <a:defRPr sz="2070" kern="1200">
           <a:solidFill>
             <a:schemeClr val="tx1"/>
           </a:solidFill>
@@ -2866,8 +2869,8 @@
           <a:cs typeface="+mn-cs"/>
         </a:defRPr>
       </a:lvl1pPr>
-      <a:lvl2pPr marL="696087" algn="l" defTabSz="1392174" rtl="0" eaLnBrk="1" latinLnBrk="0" hangingPunct="1">
-        <a:defRPr sz="2741" kern="1200">
+      <a:lvl2pPr marL="525780" algn="l" defTabSz="1051560" rtl="0" eaLnBrk="1" latinLnBrk="0" hangingPunct="1">
+        <a:defRPr sz="2070" kern="1200">
           <a:solidFill>
             <a:schemeClr val="tx1"/>
           </a:solidFill>
@@ -2876,8 +2879,8 @@
           <a:cs typeface="+mn-cs"/>
         </a:defRPr>
       </a:lvl2pPr>
-      <a:lvl3pPr marL="1392174" algn="l" defTabSz="1392174" rtl="0" eaLnBrk="1" latinLnBrk="0" hangingPunct="1">
-        <a:defRPr sz="2741" kern="1200">
+      <a:lvl3pPr marL="1051560" algn="l" defTabSz="1051560" rtl="0" eaLnBrk="1" latinLnBrk="0" hangingPunct="1">
+        <a:defRPr sz="2070" kern="1200">
           <a:solidFill>
             <a:schemeClr val="tx1"/>
           </a:solidFill>
@@ -2886,8 +2889,8 @@
           <a:cs typeface="+mn-cs"/>
         </a:defRPr>
       </a:lvl3pPr>
-      <a:lvl4pPr marL="2088261" algn="l" defTabSz="1392174" rtl="0" eaLnBrk="1" latinLnBrk="0" hangingPunct="1">
-        <a:defRPr sz="2741" kern="1200">
+      <a:lvl4pPr marL="1577340" algn="l" defTabSz="1051560" rtl="0" eaLnBrk="1" latinLnBrk="0" hangingPunct="1">
+        <a:defRPr sz="2070" kern="1200">
           <a:solidFill>
             <a:schemeClr val="tx1"/>
           </a:solidFill>
@@ -2896,8 +2899,8 @@
           <a:cs typeface="+mn-cs"/>
         </a:defRPr>
       </a:lvl4pPr>
-      <a:lvl5pPr marL="2784348" algn="l" defTabSz="1392174" rtl="0" eaLnBrk="1" latinLnBrk="0" hangingPunct="1">
-        <a:defRPr sz="2741" kern="1200">
+      <a:lvl5pPr marL="2103120" algn="l" defTabSz="1051560" rtl="0" eaLnBrk="1" latinLnBrk="0" hangingPunct="1">
+        <a:defRPr sz="2070" kern="1200">
           <a:solidFill>
             <a:schemeClr val="tx1"/>
           </a:solidFill>
@@ -2906,8 +2909,8 @@
           <a:cs typeface="+mn-cs"/>
         </a:defRPr>
       </a:lvl5pPr>
-      <a:lvl6pPr marL="3480435" algn="l" defTabSz="1392174" rtl="0" eaLnBrk="1" latinLnBrk="0" hangingPunct="1">
-        <a:defRPr sz="2741" kern="1200">
+      <a:lvl6pPr marL="2628900" algn="l" defTabSz="1051560" rtl="0" eaLnBrk="1" latinLnBrk="0" hangingPunct="1">
+        <a:defRPr sz="2070" kern="1200">
           <a:solidFill>
             <a:schemeClr val="tx1"/>
           </a:solidFill>
@@ -2916,8 +2919,8 @@
           <a:cs typeface="+mn-cs"/>
         </a:defRPr>
       </a:lvl6pPr>
-      <a:lvl7pPr marL="4176522" algn="l" defTabSz="1392174" rtl="0" eaLnBrk="1" latinLnBrk="0" hangingPunct="1">
-        <a:defRPr sz="2741" kern="1200">
+      <a:lvl7pPr marL="3154680" algn="l" defTabSz="1051560" rtl="0" eaLnBrk="1" latinLnBrk="0" hangingPunct="1">
+        <a:defRPr sz="2070" kern="1200">
           <a:solidFill>
             <a:schemeClr val="tx1"/>
           </a:solidFill>
@@ -2926,8 +2929,8 @@
           <a:cs typeface="+mn-cs"/>
         </a:defRPr>
       </a:lvl7pPr>
-      <a:lvl8pPr marL="4872609" algn="l" defTabSz="1392174" rtl="0" eaLnBrk="1" latinLnBrk="0" hangingPunct="1">
-        <a:defRPr sz="2741" kern="1200">
+      <a:lvl8pPr marL="3680460" algn="l" defTabSz="1051560" rtl="0" eaLnBrk="1" latinLnBrk="0" hangingPunct="1">
+        <a:defRPr sz="2070" kern="1200">
           <a:solidFill>
             <a:schemeClr val="tx1"/>
           </a:solidFill>
@@ -2936,8 +2939,8 @@
           <a:cs typeface="+mn-cs"/>
         </a:defRPr>
       </a:lvl8pPr>
-      <a:lvl9pPr marL="5568696" algn="l" defTabSz="1392174" rtl="0" eaLnBrk="1" latinLnBrk="0" hangingPunct="1">
-        <a:defRPr sz="2741" kern="1200">
+      <a:lvl9pPr marL="4206240" algn="l" defTabSz="1051560" rtl="0" eaLnBrk="1" latinLnBrk="0" hangingPunct="1">
+        <a:defRPr sz="2070" kern="1200">
           <a:solidFill>
             <a:schemeClr val="tx1"/>
           </a:solidFill>
@@ -2989,9 +2992,9 @@
           </a:stretch>
         </p:blipFill>
         <p:spPr>
-          <a:xfrm>
-            <a:off x="0" y="0"/>
-            <a:ext cx="18694400" cy="10515600"/>
+          <a:xfrm rot="5400000">
+            <a:off x="-4023520" y="4023519"/>
+            <a:ext cx="18562638" cy="10515600"/>
           </a:xfrm>
           <a:prstGeom prst="rect">
             <a:avLst/>
@@ -3020,8 +3023,8 @@
         </p:blipFill>
         <p:spPr>
           <a:xfrm>
-            <a:off x="17353980" y="174228"/>
-            <a:ext cx="740171" cy="740171"/>
+            <a:off x="9198199" y="223333"/>
+            <a:ext cx="1064993" cy="1064993"/>
           </a:xfrm>
           <a:prstGeom prst="rect">
             <a:avLst/>

</xml_diff>

<commit_message>
Changed background, changed steps for EMG
</commit_message>
<xml_diff>
--- a/Background Creator.pptx
+++ b/Background Creator.pptx
@@ -2,12 +2,12 @@
 <file path=ppt/presentation.xml><?xml version="1.0" encoding="utf-8"?>
 <p:presentation xmlns:a="http://schemas.openxmlformats.org/drawingml/2006/main" xmlns:r="http://schemas.openxmlformats.org/officeDocument/2006/relationships" xmlns:p="http://schemas.openxmlformats.org/presentationml/2006/main" saveSubsetFonts="1">
   <p:sldMasterIdLst>
-    <p:sldMasterId id="2147483816" r:id="rId1"/>
+    <p:sldMasterId id="2147483828" r:id="rId1"/>
   </p:sldMasterIdLst>
   <p:sldIdLst>
     <p:sldId id="256" r:id="rId2"/>
   </p:sldIdLst>
-  <p:sldSz cx="10515600" cy="18562638"/>
+  <p:sldSz cx="33000950" cy="18562638"/>
   <p:notesSz cx="6858000" cy="9144000"/>
   <p:defaultTextStyle>
     <a:defPPr>
@@ -141,15 +141,15 @@
         </p:nvSpPr>
         <p:spPr>
           <a:xfrm>
-            <a:off x="788670" y="3037915"/>
-            <a:ext cx="8938260" cy="6462548"/>
+            <a:off x="4125119" y="3037915"/>
+            <a:ext cx="24750713" cy="6462548"/>
           </a:xfrm>
         </p:spPr>
         <p:txBody>
           <a:bodyPr anchor="b"/>
           <a:lstStyle>
             <a:lvl1pPr algn="ctr">
-              <a:defRPr sz="6900"/>
+              <a:defRPr sz="16240"/>
             </a:lvl1pPr>
           </a:lstStyle>
           <a:p>
@@ -173,8 +173,8 @@
         </p:nvSpPr>
         <p:spPr>
           <a:xfrm>
-            <a:off x="1314450" y="9749683"/>
-            <a:ext cx="7886700" cy="4481673"/>
+            <a:off x="4125119" y="9749683"/>
+            <a:ext cx="24750713" cy="4481673"/>
           </a:xfrm>
         </p:spPr>
         <p:txBody>
@@ -182,39 +182,39 @@
           <a:lstStyle>
             <a:lvl1pPr marL="0" indent="0" algn="ctr">
               <a:buNone/>
-              <a:defRPr sz="2760"/>
+              <a:defRPr sz="6496"/>
             </a:lvl1pPr>
-            <a:lvl2pPr marL="525780" indent="0" algn="ctr">
-              <a:buNone/>
-              <a:defRPr sz="2300"/>
+            <a:lvl2pPr marL="1237503" indent="0" algn="ctr">
+              <a:buNone/>
+              <a:defRPr sz="5413"/>
             </a:lvl2pPr>
-            <a:lvl3pPr marL="1051560" indent="0" algn="ctr">
-              <a:buNone/>
-              <a:defRPr sz="2070"/>
+            <a:lvl3pPr marL="2475006" indent="0" algn="ctr">
+              <a:buNone/>
+              <a:defRPr sz="4872"/>
             </a:lvl3pPr>
-            <a:lvl4pPr marL="1577340" indent="0" algn="ctr">
-              <a:buNone/>
-              <a:defRPr sz="1840"/>
+            <a:lvl4pPr marL="3712510" indent="0" algn="ctr">
+              <a:buNone/>
+              <a:defRPr sz="4331"/>
             </a:lvl4pPr>
-            <a:lvl5pPr marL="2103120" indent="0" algn="ctr">
-              <a:buNone/>
-              <a:defRPr sz="1840"/>
+            <a:lvl5pPr marL="4950013" indent="0" algn="ctr">
+              <a:buNone/>
+              <a:defRPr sz="4331"/>
             </a:lvl5pPr>
-            <a:lvl6pPr marL="2628900" indent="0" algn="ctr">
-              <a:buNone/>
-              <a:defRPr sz="1840"/>
+            <a:lvl6pPr marL="6187516" indent="0" algn="ctr">
+              <a:buNone/>
+              <a:defRPr sz="4331"/>
             </a:lvl6pPr>
-            <a:lvl7pPr marL="3154680" indent="0" algn="ctr">
-              <a:buNone/>
-              <a:defRPr sz="1840"/>
+            <a:lvl7pPr marL="7425019" indent="0" algn="ctr">
+              <a:buNone/>
+              <a:defRPr sz="4331"/>
             </a:lvl7pPr>
-            <a:lvl8pPr marL="3680460" indent="0" algn="ctr">
-              <a:buNone/>
-              <a:defRPr sz="1840"/>
+            <a:lvl8pPr marL="8662523" indent="0" algn="ctr">
+              <a:buNone/>
+              <a:defRPr sz="4331"/>
             </a:lvl8pPr>
-            <a:lvl9pPr marL="4206240" indent="0" algn="ctr">
-              <a:buNone/>
-              <a:defRPr sz="1840"/>
+            <a:lvl9pPr marL="9900026" indent="0" algn="ctr">
+              <a:buNone/>
+              <a:defRPr sz="4331"/>
             </a:lvl9pPr>
           </a:lstStyle>
           <a:p>
@@ -243,7 +243,7 @@
           <a:p>
             <a:fld id="{B8513C00-EA50-43F5-8BD2-BB1AC7D70113}" type="datetimeFigureOut">
               <a:rPr lang="en-US" smtClean="0"/>
-              <a:t>1/5/2017</a:t>
+              <a:t>4/26/2017</a:t>
             </a:fld>
             <a:endParaRPr lang="en-US"/>
           </a:p>
@@ -294,7 +294,7 @@
     </p:spTree>
     <p:extLst>
       <p:ext uri="{BB962C8B-B14F-4D97-AF65-F5344CB8AC3E}">
-        <p14:creationId xmlns:p14="http://schemas.microsoft.com/office/powerpoint/2010/main" val="2508915779"/>
+        <p14:creationId xmlns:p14="http://schemas.microsoft.com/office/powerpoint/2010/main" val="573467488"/>
       </p:ext>
     </p:extLst>
   </p:cSld>
@@ -413,7 +413,7 @@
           <a:p>
             <a:fld id="{B8513C00-EA50-43F5-8BD2-BB1AC7D70113}" type="datetimeFigureOut">
               <a:rPr lang="en-US" smtClean="0"/>
-              <a:t>1/5/2017</a:t>
+              <a:t>4/26/2017</a:t>
             </a:fld>
             <a:endParaRPr lang="en-US"/>
           </a:p>
@@ -464,7 +464,7 @@
     </p:spTree>
     <p:extLst>
       <p:ext uri="{BB962C8B-B14F-4D97-AF65-F5344CB8AC3E}">
-        <p14:creationId xmlns:p14="http://schemas.microsoft.com/office/powerpoint/2010/main" val="4167361293"/>
+        <p14:creationId xmlns:p14="http://schemas.microsoft.com/office/powerpoint/2010/main" val="3180573257"/>
       </p:ext>
     </p:extLst>
   </p:cSld>
@@ -503,8 +503,8 @@
         </p:nvSpPr>
         <p:spPr>
           <a:xfrm>
-            <a:off x="7525227" y="988288"/>
-            <a:ext cx="2267426" cy="15730978"/>
+            <a:off x="23616305" y="988288"/>
+            <a:ext cx="7115830" cy="15730978"/>
           </a:xfrm>
         </p:spPr>
         <p:txBody>
@@ -531,8 +531,8 @@
         </p:nvSpPr>
         <p:spPr>
           <a:xfrm>
-            <a:off x="722948" y="988288"/>
-            <a:ext cx="6670834" cy="15730978"/>
+            <a:off x="2268815" y="988288"/>
+            <a:ext cx="20934978" cy="15730978"/>
           </a:xfrm>
         </p:spPr>
         <p:txBody>
@@ -593,7 +593,7 @@
           <a:p>
             <a:fld id="{B8513C00-EA50-43F5-8BD2-BB1AC7D70113}" type="datetimeFigureOut">
               <a:rPr lang="en-US" smtClean="0"/>
-              <a:t>1/5/2017</a:t>
+              <a:t>4/26/2017</a:t>
             </a:fld>
             <a:endParaRPr lang="en-US"/>
           </a:p>
@@ -644,7 +644,7 @@
     </p:spTree>
     <p:extLst>
       <p:ext uri="{BB962C8B-B14F-4D97-AF65-F5344CB8AC3E}">
-        <p14:creationId xmlns:p14="http://schemas.microsoft.com/office/powerpoint/2010/main" val="2799099547"/>
+        <p14:creationId xmlns:p14="http://schemas.microsoft.com/office/powerpoint/2010/main" val="1320201676"/>
       </p:ext>
     </p:extLst>
   </p:cSld>
@@ -763,7 +763,7 @@
           <a:p>
             <a:fld id="{B8513C00-EA50-43F5-8BD2-BB1AC7D70113}" type="datetimeFigureOut">
               <a:rPr lang="en-US" smtClean="0"/>
-              <a:t>1/5/2017</a:t>
+              <a:t>4/26/2017</a:t>
             </a:fld>
             <a:endParaRPr lang="en-US"/>
           </a:p>
@@ -814,7 +814,7 @@
     </p:spTree>
     <p:extLst>
       <p:ext uri="{BB962C8B-B14F-4D97-AF65-F5344CB8AC3E}">
-        <p14:creationId xmlns:p14="http://schemas.microsoft.com/office/powerpoint/2010/main" val="2696832192"/>
+        <p14:creationId xmlns:p14="http://schemas.microsoft.com/office/powerpoint/2010/main" val="2888210475"/>
       </p:ext>
     </p:extLst>
   </p:cSld>
@@ -853,15 +853,15 @@
         </p:nvSpPr>
         <p:spPr>
           <a:xfrm>
-            <a:off x="717471" y="4627774"/>
-            <a:ext cx="9069705" cy="7721540"/>
+            <a:off x="2251628" y="4627772"/>
+            <a:ext cx="28463319" cy="7721540"/>
           </a:xfrm>
         </p:spPr>
         <p:txBody>
           <a:bodyPr anchor="b"/>
           <a:lstStyle>
             <a:lvl1pPr>
-              <a:defRPr sz="6900"/>
+              <a:defRPr sz="16240"/>
             </a:lvl1pPr>
           </a:lstStyle>
           <a:p>
@@ -885,8 +885,8 @@
         </p:nvSpPr>
         <p:spPr>
           <a:xfrm>
-            <a:off x="717471" y="12422363"/>
-            <a:ext cx="9069705" cy="4060576"/>
+            <a:off x="2251628" y="12422361"/>
+            <a:ext cx="28463319" cy="4060576"/>
           </a:xfrm>
         </p:spPr>
         <p:txBody>
@@ -894,15 +894,17 @@
           <a:lstStyle>
             <a:lvl1pPr marL="0" indent="0">
               <a:buNone/>
-              <a:defRPr sz="2760">
+              <a:defRPr sz="6496">
                 <a:solidFill>
-                  <a:schemeClr val="tx1"/>
+                  <a:schemeClr val="tx1">
+                    <a:tint val="75000"/>
+                  </a:schemeClr>
                 </a:solidFill>
               </a:defRPr>
             </a:lvl1pPr>
-            <a:lvl2pPr marL="525780" indent="0">
-              <a:buNone/>
-              <a:defRPr sz="2300">
+            <a:lvl2pPr marL="1237503" indent="0">
+              <a:buNone/>
+              <a:defRPr sz="5413">
                 <a:solidFill>
                   <a:schemeClr val="tx1">
                     <a:tint val="75000"/>
@@ -910,9 +912,9 @@
                 </a:solidFill>
               </a:defRPr>
             </a:lvl2pPr>
-            <a:lvl3pPr marL="1051560" indent="0">
-              <a:buNone/>
-              <a:defRPr sz="2070">
+            <a:lvl3pPr marL="2475006" indent="0">
+              <a:buNone/>
+              <a:defRPr sz="4872">
                 <a:solidFill>
                   <a:schemeClr val="tx1">
                     <a:tint val="75000"/>
@@ -920,9 +922,9 @@
                 </a:solidFill>
               </a:defRPr>
             </a:lvl3pPr>
-            <a:lvl4pPr marL="1577340" indent="0">
-              <a:buNone/>
-              <a:defRPr sz="1840">
+            <a:lvl4pPr marL="3712510" indent="0">
+              <a:buNone/>
+              <a:defRPr sz="4331">
                 <a:solidFill>
                   <a:schemeClr val="tx1">
                     <a:tint val="75000"/>
@@ -930,9 +932,9 @@
                 </a:solidFill>
               </a:defRPr>
             </a:lvl4pPr>
-            <a:lvl5pPr marL="2103120" indent="0">
-              <a:buNone/>
-              <a:defRPr sz="1840">
+            <a:lvl5pPr marL="4950013" indent="0">
+              <a:buNone/>
+              <a:defRPr sz="4331">
                 <a:solidFill>
                   <a:schemeClr val="tx1">
                     <a:tint val="75000"/>
@@ -940,9 +942,9 @@
                 </a:solidFill>
               </a:defRPr>
             </a:lvl5pPr>
-            <a:lvl6pPr marL="2628900" indent="0">
-              <a:buNone/>
-              <a:defRPr sz="1840">
+            <a:lvl6pPr marL="6187516" indent="0">
+              <a:buNone/>
+              <a:defRPr sz="4331">
                 <a:solidFill>
                   <a:schemeClr val="tx1">
                     <a:tint val="75000"/>
@@ -950,9 +952,9 @@
                 </a:solidFill>
               </a:defRPr>
             </a:lvl6pPr>
-            <a:lvl7pPr marL="3154680" indent="0">
-              <a:buNone/>
-              <a:defRPr sz="1840">
+            <a:lvl7pPr marL="7425019" indent="0">
+              <a:buNone/>
+              <a:defRPr sz="4331">
                 <a:solidFill>
                   <a:schemeClr val="tx1">
                     <a:tint val="75000"/>
@@ -960,9 +962,9 @@
                 </a:solidFill>
               </a:defRPr>
             </a:lvl7pPr>
-            <a:lvl8pPr marL="3680460" indent="0">
-              <a:buNone/>
-              <a:defRPr sz="1840">
+            <a:lvl8pPr marL="8662523" indent="0">
+              <a:buNone/>
+              <a:defRPr sz="4331">
                 <a:solidFill>
                   <a:schemeClr val="tx1">
                     <a:tint val="75000"/>
@@ -970,9 +972,9 @@
                 </a:solidFill>
               </a:defRPr>
             </a:lvl8pPr>
-            <a:lvl9pPr marL="4206240" indent="0">
-              <a:buNone/>
-              <a:defRPr sz="1840">
+            <a:lvl9pPr marL="9900026" indent="0">
+              <a:buNone/>
+              <a:defRPr sz="4331">
                 <a:solidFill>
                   <a:schemeClr val="tx1">
                     <a:tint val="75000"/>
@@ -1007,7 +1009,7 @@
           <a:p>
             <a:fld id="{B8513C00-EA50-43F5-8BD2-BB1AC7D70113}" type="datetimeFigureOut">
               <a:rPr lang="en-US" smtClean="0"/>
-              <a:t>1/5/2017</a:t>
+              <a:t>4/26/2017</a:t>
             </a:fld>
             <a:endParaRPr lang="en-US"/>
           </a:p>
@@ -1058,7 +1060,7 @@
     </p:spTree>
     <p:extLst>
       <p:ext uri="{BB962C8B-B14F-4D97-AF65-F5344CB8AC3E}">
-        <p14:creationId xmlns:p14="http://schemas.microsoft.com/office/powerpoint/2010/main" val="2509831690"/>
+        <p14:creationId xmlns:p14="http://schemas.microsoft.com/office/powerpoint/2010/main" val="3493729147"/>
       </p:ext>
     </p:extLst>
   </p:cSld>
@@ -1120,8 +1122,8 @@
         </p:nvSpPr>
         <p:spPr>
           <a:xfrm>
-            <a:off x="722948" y="4941443"/>
-            <a:ext cx="4469130" cy="11777823"/>
+            <a:off x="2268815" y="4941443"/>
+            <a:ext cx="14025404" cy="11777823"/>
           </a:xfrm>
         </p:spPr>
         <p:txBody>
@@ -1177,8 +1179,8 @@
         </p:nvSpPr>
         <p:spPr>
           <a:xfrm>
-            <a:off x="5323523" y="4941443"/>
-            <a:ext cx="4469130" cy="11777823"/>
+            <a:off x="16706731" y="4941443"/>
+            <a:ext cx="14025404" cy="11777823"/>
           </a:xfrm>
         </p:spPr>
         <p:txBody>
@@ -1239,7 +1241,7 @@
           <a:p>
             <a:fld id="{B8513C00-EA50-43F5-8BD2-BB1AC7D70113}" type="datetimeFigureOut">
               <a:rPr lang="en-US" smtClean="0"/>
-              <a:t>1/5/2017</a:t>
+              <a:t>4/26/2017</a:t>
             </a:fld>
             <a:endParaRPr lang="en-US"/>
           </a:p>
@@ -1290,7 +1292,7 @@
     </p:spTree>
     <p:extLst>
       <p:ext uri="{BB962C8B-B14F-4D97-AF65-F5344CB8AC3E}">
-        <p14:creationId xmlns:p14="http://schemas.microsoft.com/office/powerpoint/2010/main" val="3722510688"/>
+        <p14:creationId xmlns:p14="http://schemas.microsoft.com/office/powerpoint/2010/main" val="2845480866"/>
       </p:ext>
     </p:extLst>
   </p:cSld>
@@ -1329,8 +1331,8 @@
         </p:nvSpPr>
         <p:spPr>
           <a:xfrm>
-            <a:off x="724317" y="988292"/>
-            <a:ext cx="9069705" cy="3587919"/>
+            <a:off x="2273114" y="988290"/>
+            <a:ext cx="28463319" cy="3587919"/>
           </a:xfrm>
         </p:spPr>
         <p:txBody>
@@ -1357,8 +1359,8 @@
         </p:nvSpPr>
         <p:spPr>
           <a:xfrm>
-            <a:off x="724318" y="4550426"/>
-            <a:ext cx="4448591" cy="2230093"/>
+            <a:off x="2273115" y="4550426"/>
+            <a:ext cx="13960947" cy="2230093"/>
           </a:xfrm>
         </p:spPr>
         <p:txBody>
@@ -1366,39 +1368,39 @@
           <a:lstStyle>
             <a:lvl1pPr marL="0" indent="0">
               <a:buNone/>
-              <a:defRPr sz="2760" b="1"/>
+              <a:defRPr sz="6496" b="1"/>
             </a:lvl1pPr>
-            <a:lvl2pPr marL="525780" indent="0">
-              <a:buNone/>
-              <a:defRPr sz="2300" b="1"/>
+            <a:lvl2pPr marL="1237503" indent="0">
+              <a:buNone/>
+              <a:defRPr sz="5413" b="1"/>
             </a:lvl2pPr>
-            <a:lvl3pPr marL="1051560" indent="0">
-              <a:buNone/>
-              <a:defRPr sz="2070" b="1"/>
+            <a:lvl3pPr marL="2475006" indent="0">
+              <a:buNone/>
+              <a:defRPr sz="4872" b="1"/>
             </a:lvl3pPr>
-            <a:lvl4pPr marL="1577340" indent="0">
-              <a:buNone/>
-              <a:defRPr sz="1840" b="1"/>
+            <a:lvl4pPr marL="3712510" indent="0">
+              <a:buNone/>
+              <a:defRPr sz="4331" b="1"/>
             </a:lvl4pPr>
-            <a:lvl5pPr marL="2103120" indent="0">
-              <a:buNone/>
-              <a:defRPr sz="1840" b="1"/>
+            <a:lvl5pPr marL="4950013" indent="0">
+              <a:buNone/>
+              <a:defRPr sz="4331" b="1"/>
             </a:lvl5pPr>
-            <a:lvl6pPr marL="2628900" indent="0">
-              <a:buNone/>
-              <a:defRPr sz="1840" b="1"/>
+            <a:lvl6pPr marL="6187516" indent="0">
+              <a:buNone/>
+              <a:defRPr sz="4331" b="1"/>
             </a:lvl6pPr>
-            <a:lvl7pPr marL="3154680" indent="0">
-              <a:buNone/>
-              <a:defRPr sz="1840" b="1"/>
+            <a:lvl7pPr marL="7425019" indent="0">
+              <a:buNone/>
+              <a:defRPr sz="4331" b="1"/>
             </a:lvl7pPr>
-            <a:lvl8pPr marL="3680460" indent="0">
-              <a:buNone/>
-              <a:defRPr sz="1840" b="1"/>
+            <a:lvl8pPr marL="8662523" indent="0">
+              <a:buNone/>
+              <a:defRPr sz="4331" b="1"/>
             </a:lvl8pPr>
-            <a:lvl9pPr marL="4206240" indent="0">
-              <a:buNone/>
-              <a:defRPr sz="1840" b="1"/>
+            <a:lvl9pPr marL="9900026" indent="0">
+              <a:buNone/>
+              <a:defRPr sz="4331" b="1"/>
             </a:lvl9pPr>
           </a:lstStyle>
           <a:p>
@@ -1422,8 +1424,8 @@
         </p:nvSpPr>
         <p:spPr>
           <a:xfrm>
-            <a:off x="724318" y="6780519"/>
-            <a:ext cx="4448591" cy="9973122"/>
+            <a:off x="2273115" y="6780519"/>
+            <a:ext cx="13960947" cy="9973122"/>
           </a:xfrm>
         </p:spPr>
         <p:txBody>
@@ -1479,8 +1481,8 @@
         </p:nvSpPr>
         <p:spPr>
           <a:xfrm>
-            <a:off x="5323523" y="4550426"/>
-            <a:ext cx="4470500" cy="2230093"/>
+            <a:off x="16706731" y="4550426"/>
+            <a:ext cx="14029702" cy="2230093"/>
           </a:xfrm>
         </p:spPr>
         <p:txBody>
@@ -1488,39 +1490,39 @@
           <a:lstStyle>
             <a:lvl1pPr marL="0" indent="0">
               <a:buNone/>
-              <a:defRPr sz="2760" b="1"/>
+              <a:defRPr sz="6496" b="1"/>
             </a:lvl1pPr>
-            <a:lvl2pPr marL="525780" indent="0">
-              <a:buNone/>
-              <a:defRPr sz="2300" b="1"/>
+            <a:lvl2pPr marL="1237503" indent="0">
+              <a:buNone/>
+              <a:defRPr sz="5413" b="1"/>
             </a:lvl2pPr>
-            <a:lvl3pPr marL="1051560" indent="0">
-              <a:buNone/>
-              <a:defRPr sz="2070" b="1"/>
+            <a:lvl3pPr marL="2475006" indent="0">
+              <a:buNone/>
+              <a:defRPr sz="4872" b="1"/>
             </a:lvl3pPr>
-            <a:lvl4pPr marL="1577340" indent="0">
-              <a:buNone/>
-              <a:defRPr sz="1840" b="1"/>
+            <a:lvl4pPr marL="3712510" indent="0">
+              <a:buNone/>
+              <a:defRPr sz="4331" b="1"/>
             </a:lvl4pPr>
-            <a:lvl5pPr marL="2103120" indent="0">
-              <a:buNone/>
-              <a:defRPr sz="1840" b="1"/>
+            <a:lvl5pPr marL="4950013" indent="0">
+              <a:buNone/>
+              <a:defRPr sz="4331" b="1"/>
             </a:lvl5pPr>
-            <a:lvl6pPr marL="2628900" indent="0">
-              <a:buNone/>
-              <a:defRPr sz="1840" b="1"/>
+            <a:lvl6pPr marL="6187516" indent="0">
+              <a:buNone/>
+              <a:defRPr sz="4331" b="1"/>
             </a:lvl6pPr>
-            <a:lvl7pPr marL="3154680" indent="0">
-              <a:buNone/>
-              <a:defRPr sz="1840" b="1"/>
+            <a:lvl7pPr marL="7425019" indent="0">
+              <a:buNone/>
+              <a:defRPr sz="4331" b="1"/>
             </a:lvl7pPr>
-            <a:lvl8pPr marL="3680460" indent="0">
-              <a:buNone/>
-              <a:defRPr sz="1840" b="1"/>
+            <a:lvl8pPr marL="8662523" indent="0">
+              <a:buNone/>
+              <a:defRPr sz="4331" b="1"/>
             </a:lvl8pPr>
-            <a:lvl9pPr marL="4206240" indent="0">
-              <a:buNone/>
-              <a:defRPr sz="1840" b="1"/>
+            <a:lvl9pPr marL="9900026" indent="0">
+              <a:buNone/>
+              <a:defRPr sz="4331" b="1"/>
             </a:lvl9pPr>
           </a:lstStyle>
           <a:p>
@@ -1544,8 +1546,8 @@
         </p:nvSpPr>
         <p:spPr>
           <a:xfrm>
-            <a:off x="5323523" y="6780519"/>
-            <a:ext cx="4470500" cy="9973122"/>
+            <a:off x="16706731" y="6780519"/>
+            <a:ext cx="14029702" cy="9973122"/>
           </a:xfrm>
         </p:spPr>
         <p:txBody>
@@ -1606,7 +1608,7 @@
           <a:p>
             <a:fld id="{B8513C00-EA50-43F5-8BD2-BB1AC7D70113}" type="datetimeFigureOut">
               <a:rPr lang="en-US" smtClean="0"/>
-              <a:t>1/5/2017</a:t>
+              <a:t>4/26/2017</a:t>
             </a:fld>
             <a:endParaRPr lang="en-US"/>
           </a:p>
@@ -1657,7 +1659,7 @@
     </p:spTree>
     <p:extLst>
       <p:ext uri="{BB962C8B-B14F-4D97-AF65-F5344CB8AC3E}">
-        <p14:creationId xmlns:p14="http://schemas.microsoft.com/office/powerpoint/2010/main" val="1339929762"/>
+        <p14:creationId xmlns:p14="http://schemas.microsoft.com/office/powerpoint/2010/main" val="3252863862"/>
       </p:ext>
     </p:extLst>
   </p:cSld>
@@ -1724,7 +1726,7 @@
           <a:p>
             <a:fld id="{B8513C00-EA50-43F5-8BD2-BB1AC7D70113}" type="datetimeFigureOut">
               <a:rPr lang="en-US" smtClean="0"/>
-              <a:t>1/5/2017</a:t>
+              <a:t>4/26/2017</a:t>
             </a:fld>
             <a:endParaRPr lang="en-US"/>
           </a:p>
@@ -1775,7 +1777,7 @@
     </p:spTree>
     <p:extLst>
       <p:ext uri="{BB962C8B-B14F-4D97-AF65-F5344CB8AC3E}">
-        <p14:creationId xmlns:p14="http://schemas.microsoft.com/office/powerpoint/2010/main" val="3541698462"/>
+        <p14:creationId xmlns:p14="http://schemas.microsoft.com/office/powerpoint/2010/main" val="2461689232"/>
       </p:ext>
     </p:extLst>
   </p:cSld>
@@ -1819,7 +1821,7 @@
           <a:p>
             <a:fld id="{B8513C00-EA50-43F5-8BD2-BB1AC7D70113}" type="datetimeFigureOut">
               <a:rPr lang="en-US" smtClean="0"/>
-              <a:t>1/5/2017</a:t>
+              <a:t>4/26/2017</a:t>
             </a:fld>
             <a:endParaRPr lang="en-US"/>
           </a:p>
@@ -1870,7 +1872,7 @@
     </p:spTree>
     <p:extLst>
       <p:ext uri="{BB962C8B-B14F-4D97-AF65-F5344CB8AC3E}">
-        <p14:creationId xmlns:p14="http://schemas.microsoft.com/office/powerpoint/2010/main" val="153700282"/>
+        <p14:creationId xmlns:p14="http://schemas.microsoft.com/office/powerpoint/2010/main" val="1540407848"/>
       </p:ext>
     </p:extLst>
   </p:cSld>
@@ -1909,15 +1911,15 @@
         </p:nvSpPr>
         <p:spPr>
           <a:xfrm>
-            <a:off x="724317" y="1237509"/>
-            <a:ext cx="3391555" cy="4331282"/>
+            <a:off x="2273115" y="1237509"/>
+            <a:ext cx="10643664" cy="4331282"/>
           </a:xfrm>
         </p:spPr>
         <p:txBody>
           <a:bodyPr anchor="b"/>
           <a:lstStyle>
             <a:lvl1pPr>
-              <a:defRPr sz="3680"/>
+              <a:defRPr sz="8661"/>
             </a:lvl1pPr>
           </a:lstStyle>
           <a:p>
@@ -1941,39 +1943,39 @@
         </p:nvSpPr>
         <p:spPr>
           <a:xfrm>
-            <a:off x="4470499" y="2672680"/>
-            <a:ext cx="5323523" cy="13191504"/>
+            <a:off x="14029702" y="2672678"/>
+            <a:ext cx="16706731" cy="13191504"/>
           </a:xfrm>
         </p:spPr>
         <p:txBody>
           <a:bodyPr/>
           <a:lstStyle>
             <a:lvl1pPr>
-              <a:defRPr sz="3680"/>
+              <a:defRPr sz="8661"/>
             </a:lvl1pPr>
             <a:lvl2pPr>
-              <a:defRPr sz="3220"/>
+              <a:defRPr sz="7579"/>
             </a:lvl2pPr>
             <a:lvl3pPr>
-              <a:defRPr sz="2760"/>
+              <a:defRPr sz="6496"/>
             </a:lvl3pPr>
             <a:lvl4pPr>
-              <a:defRPr sz="2300"/>
+              <a:defRPr sz="5413"/>
             </a:lvl4pPr>
             <a:lvl5pPr>
-              <a:defRPr sz="2300"/>
+              <a:defRPr sz="5413"/>
             </a:lvl5pPr>
             <a:lvl6pPr>
-              <a:defRPr sz="2300"/>
+              <a:defRPr sz="5413"/>
             </a:lvl6pPr>
             <a:lvl7pPr>
-              <a:defRPr sz="2300"/>
+              <a:defRPr sz="5413"/>
             </a:lvl7pPr>
             <a:lvl8pPr>
-              <a:defRPr sz="2300"/>
+              <a:defRPr sz="5413"/>
             </a:lvl8pPr>
             <a:lvl9pPr>
-              <a:defRPr sz="2300"/>
+              <a:defRPr sz="5413"/>
             </a:lvl9pPr>
           </a:lstStyle>
           <a:p>
@@ -2026,8 +2028,8 @@
         </p:nvSpPr>
         <p:spPr>
           <a:xfrm>
-            <a:off x="724317" y="5568791"/>
-            <a:ext cx="3391555" cy="10316875"/>
+            <a:off x="2273115" y="5568791"/>
+            <a:ext cx="10643664" cy="10316875"/>
           </a:xfrm>
         </p:spPr>
         <p:txBody>
@@ -2035,39 +2037,39 @@
           <a:lstStyle>
             <a:lvl1pPr marL="0" indent="0">
               <a:buNone/>
-              <a:defRPr sz="1840"/>
+              <a:defRPr sz="4331"/>
             </a:lvl1pPr>
-            <a:lvl2pPr marL="525780" indent="0">
-              <a:buNone/>
-              <a:defRPr sz="1610"/>
+            <a:lvl2pPr marL="1237503" indent="0">
+              <a:buNone/>
+              <a:defRPr sz="3789"/>
             </a:lvl2pPr>
-            <a:lvl3pPr marL="1051560" indent="0">
-              <a:buNone/>
-              <a:defRPr sz="1380"/>
+            <a:lvl3pPr marL="2475006" indent="0">
+              <a:buNone/>
+              <a:defRPr sz="3248"/>
             </a:lvl3pPr>
-            <a:lvl4pPr marL="1577340" indent="0">
-              <a:buNone/>
-              <a:defRPr sz="1150"/>
+            <a:lvl4pPr marL="3712510" indent="0">
+              <a:buNone/>
+              <a:defRPr sz="2707"/>
             </a:lvl4pPr>
-            <a:lvl5pPr marL="2103120" indent="0">
-              <a:buNone/>
-              <a:defRPr sz="1150"/>
+            <a:lvl5pPr marL="4950013" indent="0">
+              <a:buNone/>
+              <a:defRPr sz="2707"/>
             </a:lvl5pPr>
-            <a:lvl6pPr marL="2628900" indent="0">
-              <a:buNone/>
-              <a:defRPr sz="1150"/>
+            <a:lvl6pPr marL="6187516" indent="0">
+              <a:buNone/>
+              <a:defRPr sz="2707"/>
             </a:lvl6pPr>
-            <a:lvl7pPr marL="3154680" indent="0">
-              <a:buNone/>
-              <a:defRPr sz="1150"/>
+            <a:lvl7pPr marL="7425019" indent="0">
+              <a:buNone/>
+              <a:defRPr sz="2707"/>
             </a:lvl7pPr>
-            <a:lvl8pPr marL="3680460" indent="0">
-              <a:buNone/>
-              <a:defRPr sz="1150"/>
+            <a:lvl8pPr marL="8662523" indent="0">
+              <a:buNone/>
+              <a:defRPr sz="2707"/>
             </a:lvl8pPr>
-            <a:lvl9pPr marL="4206240" indent="0">
-              <a:buNone/>
-              <a:defRPr sz="1150"/>
+            <a:lvl9pPr marL="9900026" indent="0">
+              <a:buNone/>
+              <a:defRPr sz="2707"/>
             </a:lvl9pPr>
           </a:lstStyle>
           <a:p>
@@ -2096,7 +2098,7 @@
           <a:p>
             <a:fld id="{B8513C00-EA50-43F5-8BD2-BB1AC7D70113}" type="datetimeFigureOut">
               <a:rPr lang="en-US" smtClean="0"/>
-              <a:t>1/5/2017</a:t>
+              <a:t>4/26/2017</a:t>
             </a:fld>
             <a:endParaRPr lang="en-US"/>
           </a:p>
@@ -2147,7 +2149,7 @@
     </p:spTree>
     <p:extLst>
       <p:ext uri="{BB962C8B-B14F-4D97-AF65-F5344CB8AC3E}">
-        <p14:creationId xmlns:p14="http://schemas.microsoft.com/office/powerpoint/2010/main" val="2413207881"/>
+        <p14:creationId xmlns:p14="http://schemas.microsoft.com/office/powerpoint/2010/main" val="2001609258"/>
       </p:ext>
     </p:extLst>
   </p:cSld>
@@ -2186,15 +2188,15 @@
         </p:nvSpPr>
         <p:spPr>
           <a:xfrm>
-            <a:off x="724317" y="1237509"/>
-            <a:ext cx="3391555" cy="4331282"/>
+            <a:off x="2273115" y="1237509"/>
+            <a:ext cx="10643664" cy="4331282"/>
           </a:xfrm>
         </p:spPr>
         <p:txBody>
           <a:bodyPr anchor="b"/>
           <a:lstStyle>
             <a:lvl1pPr>
-              <a:defRPr sz="3680"/>
+              <a:defRPr sz="8661"/>
             </a:lvl1pPr>
           </a:lstStyle>
           <a:p>
@@ -2218,8 +2220,8 @@
         </p:nvSpPr>
         <p:spPr>
           <a:xfrm>
-            <a:off x="4470499" y="2672680"/>
-            <a:ext cx="5323523" cy="13191504"/>
+            <a:off x="14029702" y="2672678"/>
+            <a:ext cx="16706731" cy="13191504"/>
           </a:xfrm>
         </p:spPr>
         <p:txBody>
@@ -2227,39 +2229,39 @@
           <a:lstStyle>
             <a:lvl1pPr marL="0" indent="0">
               <a:buNone/>
-              <a:defRPr sz="3680"/>
+              <a:defRPr sz="8661"/>
             </a:lvl1pPr>
-            <a:lvl2pPr marL="525780" indent="0">
-              <a:buNone/>
-              <a:defRPr sz="3220"/>
+            <a:lvl2pPr marL="1237503" indent="0">
+              <a:buNone/>
+              <a:defRPr sz="7579"/>
             </a:lvl2pPr>
-            <a:lvl3pPr marL="1051560" indent="0">
-              <a:buNone/>
-              <a:defRPr sz="2760"/>
+            <a:lvl3pPr marL="2475006" indent="0">
+              <a:buNone/>
+              <a:defRPr sz="6496"/>
             </a:lvl3pPr>
-            <a:lvl4pPr marL="1577340" indent="0">
-              <a:buNone/>
-              <a:defRPr sz="2300"/>
+            <a:lvl4pPr marL="3712510" indent="0">
+              <a:buNone/>
+              <a:defRPr sz="5413"/>
             </a:lvl4pPr>
-            <a:lvl5pPr marL="2103120" indent="0">
-              <a:buNone/>
-              <a:defRPr sz="2300"/>
+            <a:lvl5pPr marL="4950013" indent="0">
+              <a:buNone/>
+              <a:defRPr sz="5413"/>
             </a:lvl5pPr>
-            <a:lvl6pPr marL="2628900" indent="0">
-              <a:buNone/>
-              <a:defRPr sz="2300"/>
+            <a:lvl6pPr marL="6187516" indent="0">
+              <a:buNone/>
+              <a:defRPr sz="5413"/>
             </a:lvl6pPr>
-            <a:lvl7pPr marL="3154680" indent="0">
-              <a:buNone/>
-              <a:defRPr sz="2300"/>
+            <a:lvl7pPr marL="7425019" indent="0">
+              <a:buNone/>
+              <a:defRPr sz="5413"/>
             </a:lvl7pPr>
-            <a:lvl8pPr marL="3680460" indent="0">
-              <a:buNone/>
-              <a:defRPr sz="2300"/>
+            <a:lvl8pPr marL="8662523" indent="0">
+              <a:buNone/>
+              <a:defRPr sz="5413"/>
             </a:lvl8pPr>
-            <a:lvl9pPr marL="4206240" indent="0">
-              <a:buNone/>
-              <a:defRPr sz="2300"/>
+            <a:lvl9pPr marL="9900026" indent="0">
+              <a:buNone/>
+              <a:defRPr sz="5413"/>
             </a:lvl9pPr>
           </a:lstStyle>
           <a:p>
@@ -2283,8 +2285,8 @@
         </p:nvSpPr>
         <p:spPr>
           <a:xfrm>
-            <a:off x="724317" y="5568791"/>
-            <a:ext cx="3391555" cy="10316875"/>
+            <a:off x="2273115" y="5568791"/>
+            <a:ext cx="10643664" cy="10316875"/>
           </a:xfrm>
         </p:spPr>
         <p:txBody>
@@ -2292,39 +2294,39 @@
           <a:lstStyle>
             <a:lvl1pPr marL="0" indent="0">
               <a:buNone/>
-              <a:defRPr sz="1840"/>
+              <a:defRPr sz="4331"/>
             </a:lvl1pPr>
-            <a:lvl2pPr marL="525780" indent="0">
-              <a:buNone/>
-              <a:defRPr sz="1610"/>
+            <a:lvl2pPr marL="1237503" indent="0">
+              <a:buNone/>
+              <a:defRPr sz="3789"/>
             </a:lvl2pPr>
-            <a:lvl3pPr marL="1051560" indent="0">
-              <a:buNone/>
-              <a:defRPr sz="1380"/>
+            <a:lvl3pPr marL="2475006" indent="0">
+              <a:buNone/>
+              <a:defRPr sz="3248"/>
             </a:lvl3pPr>
-            <a:lvl4pPr marL="1577340" indent="0">
-              <a:buNone/>
-              <a:defRPr sz="1150"/>
+            <a:lvl4pPr marL="3712510" indent="0">
+              <a:buNone/>
+              <a:defRPr sz="2707"/>
             </a:lvl4pPr>
-            <a:lvl5pPr marL="2103120" indent="0">
-              <a:buNone/>
-              <a:defRPr sz="1150"/>
+            <a:lvl5pPr marL="4950013" indent="0">
+              <a:buNone/>
+              <a:defRPr sz="2707"/>
             </a:lvl5pPr>
-            <a:lvl6pPr marL="2628900" indent="0">
-              <a:buNone/>
-              <a:defRPr sz="1150"/>
+            <a:lvl6pPr marL="6187516" indent="0">
+              <a:buNone/>
+              <a:defRPr sz="2707"/>
             </a:lvl6pPr>
-            <a:lvl7pPr marL="3154680" indent="0">
-              <a:buNone/>
-              <a:defRPr sz="1150"/>
+            <a:lvl7pPr marL="7425019" indent="0">
+              <a:buNone/>
+              <a:defRPr sz="2707"/>
             </a:lvl7pPr>
-            <a:lvl8pPr marL="3680460" indent="0">
-              <a:buNone/>
-              <a:defRPr sz="1150"/>
+            <a:lvl8pPr marL="8662523" indent="0">
+              <a:buNone/>
+              <a:defRPr sz="2707"/>
             </a:lvl8pPr>
-            <a:lvl9pPr marL="4206240" indent="0">
-              <a:buNone/>
-              <a:defRPr sz="1150"/>
+            <a:lvl9pPr marL="9900026" indent="0">
+              <a:buNone/>
+              <a:defRPr sz="2707"/>
             </a:lvl9pPr>
           </a:lstStyle>
           <a:p>
@@ -2353,7 +2355,7 @@
           <a:p>
             <a:fld id="{B8513C00-EA50-43F5-8BD2-BB1AC7D70113}" type="datetimeFigureOut">
               <a:rPr lang="en-US" smtClean="0"/>
-              <a:t>1/5/2017</a:t>
+              <a:t>4/26/2017</a:t>
             </a:fld>
             <a:endParaRPr lang="en-US"/>
           </a:p>
@@ -2404,7 +2406,7 @@
     </p:spTree>
     <p:extLst>
       <p:ext uri="{BB962C8B-B14F-4D97-AF65-F5344CB8AC3E}">
-        <p14:creationId xmlns:p14="http://schemas.microsoft.com/office/powerpoint/2010/main" val="1096938256"/>
+        <p14:creationId xmlns:p14="http://schemas.microsoft.com/office/powerpoint/2010/main" val="4103326373"/>
       </p:ext>
     </p:extLst>
   </p:cSld>
@@ -2448,8 +2450,8 @@
         </p:nvSpPr>
         <p:spPr>
           <a:xfrm>
-            <a:off x="722948" y="988292"/>
-            <a:ext cx="9069705" cy="3587919"/>
+            <a:off x="2268816" y="988290"/>
+            <a:ext cx="28463319" cy="3587919"/>
           </a:xfrm>
           <a:prstGeom prst="rect">
             <a:avLst/>
@@ -2481,8 +2483,8 @@
         </p:nvSpPr>
         <p:spPr>
           <a:xfrm>
-            <a:off x="722948" y="4941443"/>
-            <a:ext cx="9069705" cy="11777823"/>
+            <a:off x="2268816" y="4941443"/>
+            <a:ext cx="28463319" cy="11777823"/>
           </a:xfrm>
           <a:prstGeom prst="rect">
             <a:avLst/>
@@ -2543,8 +2545,8 @@
         </p:nvSpPr>
         <p:spPr>
           <a:xfrm>
-            <a:off x="722948" y="17204819"/>
-            <a:ext cx="2366010" cy="988289"/>
+            <a:off x="2268815" y="17204817"/>
+            <a:ext cx="7425214" cy="988289"/>
           </a:xfrm>
           <a:prstGeom prst="rect">
             <a:avLst/>
@@ -2554,7 +2556,7 @@
           <a:bodyPr vert="horz" lIns="91440" tIns="45720" rIns="91440" bIns="45720" rtlCol="0" anchor="ctr"/>
           <a:lstStyle>
             <a:lvl1pPr algn="l">
-              <a:defRPr sz="1380">
+              <a:defRPr sz="3248">
                 <a:solidFill>
                   <a:schemeClr val="tx1">
                     <a:tint val="75000"/>
@@ -2566,7 +2568,7 @@
           <a:p>
             <a:fld id="{B8513C00-EA50-43F5-8BD2-BB1AC7D70113}" type="datetimeFigureOut">
               <a:rPr lang="en-US" smtClean="0"/>
-              <a:t>1/5/2017</a:t>
+              <a:t>4/26/2017</a:t>
             </a:fld>
             <a:endParaRPr lang="en-US"/>
           </a:p>
@@ -2584,8 +2586,8 @@
         </p:nvSpPr>
         <p:spPr>
           <a:xfrm>
-            <a:off x="3483293" y="17204819"/>
-            <a:ext cx="3549015" cy="988289"/>
+            <a:off x="10931565" y="17204817"/>
+            <a:ext cx="11137821" cy="988289"/>
           </a:xfrm>
           <a:prstGeom prst="rect">
             <a:avLst/>
@@ -2595,7 +2597,7 @@
           <a:bodyPr vert="horz" lIns="91440" tIns="45720" rIns="91440" bIns="45720" rtlCol="0" anchor="ctr"/>
           <a:lstStyle>
             <a:lvl1pPr algn="ctr">
-              <a:defRPr sz="1380">
+              <a:defRPr sz="3248">
                 <a:solidFill>
                   <a:schemeClr val="tx1">
                     <a:tint val="75000"/>
@@ -2621,8 +2623,8 @@
         </p:nvSpPr>
         <p:spPr>
           <a:xfrm>
-            <a:off x="7426643" y="17204819"/>
-            <a:ext cx="2366010" cy="988289"/>
+            <a:off x="23306921" y="17204817"/>
+            <a:ext cx="7425214" cy="988289"/>
           </a:xfrm>
           <a:prstGeom prst="rect">
             <a:avLst/>
@@ -2632,7 +2634,7 @@
           <a:bodyPr vert="horz" lIns="91440" tIns="45720" rIns="91440" bIns="45720" rtlCol="0" anchor="ctr"/>
           <a:lstStyle>
             <a:lvl1pPr algn="r">
-              <a:defRPr sz="1380">
+              <a:defRPr sz="3248">
                 <a:solidFill>
                   <a:schemeClr val="tx1">
                     <a:tint val="75000"/>
@@ -2653,27 +2655,27 @@
     </p:spTree>
     <p:extLst>
       <p:ext uri="{BB962C8B-B14F-4D97-AF65-F5344CB8AC3E}">
-        <p14:creationId xmlns:p14="http://schemas.microsoft.com/office/powerpoint/2010/main" val="1786263181"/>
+        <p14:creationId xmlns:p14="http://schemas.microsoft.com/office/powerpoint/2010/main" val="795008296"/>
       </p:ext>
     </p:extLst>
   </p:cSld>
   <p:clrMap bg1="lt1" tx1="dk1" bg2="lt2" tx2="dk2" accent1="accent1" accent2="accent2" accent3="accent3" accent4="accent4" accent5="accent5" accent6="accent6" hlink="hlink" folHlink="folHlink"/>
   <p:sldLayoutIdLst>
-    <p:sldLayoutId id="2147483817" r:id="rId1"/>
-    <p:sldLayoutId id="2147483818" r:id="rId2"/>
-    <p:sldLayoutId id="2147483819" r:id="rId3"/>
-    <p:sldLayoutId id="2147483820" r:id="rId4"/>
-    <p:sldLayoutId id="2147483821" r:id="rId5"/>
-    <p:sldLayoutId id="2147483822" r:id="rId6"/>
-    <p:sldLayoutId id="2147483823" r:id="rId7"/>
-    <p:sldLayoutId id="2147483824" r:id="rId8"/>
-    <p:sldLayoutId id="2147483825" r:id="rId9"/>
-    <p:sldLayoutId id="2147483826" r:id="rId10"/>
-    <p:sldLayoutId id="2147483827" r:id="rId11"/>
+    <p:sldLayoutId id="2147483829" r:id="rId1"/>
+    <p:sldLayoutId id="2147483830" r:id="rId2"/>
+    <p:sldLayoutId id="2147483831" r:id="rId3"/>
+    <p:sldLayoutId id="2147483832" r:id="rId4"/>
+    <p:sldLayoutId id="2147483833" r:id="rId5"/>
+    <p:sldLayoutId id="2147483834" r:id="rId6"/>
+    <p:sldLayoutId id="2147483835" r:id="rId7"/>
+    <p:sldLayoutId id="2147483836" r:id="rId8"/>
+    <p:sldLayoutId id="2147483837" r:id="rId9"/>
+    <p:sldLayoutId id="2147483838" r:id="rId10"/>
+    <p:sldLayoutId id="2147483839" r:id="rId11"/>
   </p:sldLayoutIdLst>
   <p:txStyles>
     <p:titleStyle>
-      <a:lvl1pPr algn="l" defTabSz="1051560" rtl="0" eaLnBrk="1" latinLnBrk="0" hangingPunct="1">
+      <a:lvl1pPr algn="l" defTabSz="2475006" rtl="0" eaLnBrk="1" latinLnBrk="0" hangingPunct="1">
         <a:lnSpc>
           <a:spcPct val="90000"/>
         </a:lnSpc>
@@ -2681,7 +2683,7 @@
           <a:spcPct val="0"/>
         </a:spcBef>
         <a:buNone/>
-        <a:defRPr sz="5060" kern="1200">
+        <a:defRPr sz="11909" kern="1200">
           <a:solidFill>
             <a:schemeClr val="tx1"/>
           </a:solidFill>
@@ -2692,16 +2694,16 @@
       </a:lvl1pPr>
     </p:titleStyle>
     <p:bodyStyle>
-      <a:lvl1pPr marL="262890" indent="-262890" algn="l" defTabSz="1051560" rtl="0" eaLnBrk="1" latinLnBrk="0" hangingPunct="1">
+      <a:lvl1pPr marL="618752" indent="-618752" algn="l" defTabSz="2475006" rtl="0" eaLnBrk="1" latinLnBrk="0" hangingPunct="1">
         <a:lnSpc>
           <a:spcPct val="90000"/>
         </a:lnSpc>
         <a:spcBef>
-          <a:spcPts val="1150"/>
+          <a:spcPts val="2707"/>
         </a:spcBef>
         <a:buFont typeface="Arial" panose="020B0604020202020204" pitchFamily="34" charset="0"/>
         <a:buChar char="•"/>
-        <a:defRPr sz="3220" kern="1200">
+        <a:defRPr sz="7579" kern="1200">
           <a:solidFill>
             <a:schemeClr val="tx1"/>
           </a:solidFill>
@@ -2710,16 +2712,16 @@
           <a:cs typeface="+mn-cs"/>
         </a:defRPr>
       </a:lvl1pPr>
-      <a:lvl2pPr marL="788670" indent="-262890" algn="l" defTabSz="1051560" rtl="0" eaLnBrk="1" latinLnBrk="0" hangingPunct="1">
+      <a:lvl2pPr marL="1856255" indent="-618752" algn="l" defTabSz="2475006" rtl="0" eaLnBrk="1" latinLnBrk="0" hangingPunct="1">
         <a:lnSpc>
           <a:spcPct val="90000"/>
         </a:lnSpc>
         <a:spcBef>
-          <a:spcPts val="575"/>
+          <a:spcPts val="1353"/>
         </a:spcBef>
         <a:buFont typeface="Arial" panose="020B0604020202020204" pitchFamily="34" charset="0"/>
         <a:buChar char="•"/>
-        <a:defRPr sz="2760" kern="1200">
+        <a:defRPr sz="6496" kern="1200">
           <a:solidFill>
             <a:schemeClr val="tx1"/>
           </a:solidFill>
@@ -2728,16 +2730,16 @@
           <a:cs typeface="+mn-cs"/>
         </a:defRPr>
       </a:lvl2pPr>
-      <a:lvl3pPr marL="1314450" indent="-262890" algn="l" defTabSz="1051560" rtl="0" eaLnBrk="1" latinLnBrk="0" hangingPunct="1">
+      <a:lvl3pPr marL="3093758" indent="-618752" algn="l" defTabSz="2475006" rtl="0" eaLnBrk="1" latinLnBrk="0" hangingPunct="1">
         <a:lnSpc>
           <a:spcPct val="90000"/>
         </a:lnSpc>
         <a:spcBef>
-          <a:spcPts val="575"/>
+          <a:spcPts val="1353"/>
         </a:spcBef>
         <a:buFont typeface="Arial" panose="020B0604020202020204" pitchFamily="34" charset="0"/>
         <a:buChar char="•"/>
-        <a:defRPr sz="2300" kern="1200">
+        <a:defRPr sz="5413" kern="1200">
           <a:solidFill>
             <a:schemeClr val="tx1"/>
           </a:solidFill>
@@ -2746,16 +2748,16 @@
           <a:cs typeface="+mn-cs"/>
         </a:defRPr>
       </a:lvl3pPr>
-      <a:lvl4pPr marL="1840230" indent="-262890" algn="l" defTabSz="1051560" rtl="0" eaLnBrk="1" latinLnBrk="0" hangingPunct="1">
+      <a:lvl4pPr marL="4331261" indent="-618752" algn="l" defTabSz="2475006" rtl="0" eaLnBrk="1" latinLnBrk="0" hangingPunct="1">
         <a:lnSpc>
           <a:spcPct val="90000"/>
         </a:lnSpc>
         <a:spcBef>
-          <a:spcPts val="575"/>
+          <a:spcPts val="1353"/>
         </a:spcBef>
         <a:buFont typeface="Arial" panose="020B0604020202020204" pitchFamily="34" charset="0"/>
         <a:buChar char="•"/>
-        <a:defRPr sz="2070" kern="1200">
+        <a:defRPr sz="4872" kern="1200">
           <a:solidFill>
             <a:schemeClr val="tx1"/>
           </a:solidFill>
@@ -2764,16 +2766,16 @@
           <a:cs typeface="+mn-cs"/>
         </a:defRPr>
       </a:lvl4pPr>
-      <a:lvl5pPr marL="2366010" indent="-262890" algn="l" defTabSz="1051560" rtl="0" eaLnBrk="1" latinLnBrk="0" hangingPunct="1">
+      <a:lvl5pPr marL="5568765" indent="-618752" algn="l" defTabSz="2475006" rtl="0" eaLnBrk="1" latinLnBrk="0" hangingPunct="1">
         <a:lnSpc>
           <a:spcPct val="90000"/>
         </a:lnSpc>
         <a:spcBef>
-          <a:spcPts val="575"/>
+          <a:spcPts val="1353"/>
         </a:spcBef>
         <a:buFont typeface="Arial" panose="020B0604020202020204" pitchFamily="34" charset="0"/>
         <a:buChar char="•"/>
-        <a:defRPr sz="2070" kern="1200">
+        <a:defRPr sz="4872" kern="1200">
           <a:solidFill>
             <a:schemeClr val="tx1"/>
           </a:solidFill>
@@ -2782,16 +2784,16 @@
           <a:cs typeface="+mn-cs"/>
         </a:defRPr>
       </a:lvl5pPr>
-      <a:lvl6pPr marL="2891790" indent="-262890" algn="l" defTabSz="1051560" rtl="0" eaLnBrk="1" latinLnBrk="0" hangingPunct="1">
+      <a:lvl6pPr marL="6806268" indent="-618752" algn="l" defTabSz="2475006" rtl="0" eaLnBrk="1" latinLnBrk="0" hangingPunct="1">
         <a:lnSpc>
           <a:spcPct val="90000"/>
         </a:lnSpc>
         <a:spcBef>
-          <a:spcPts val="575"/>
+          <a:spcPts val="1353"/>
         </a:spcBef>
         <a:buFont typeface="Arial" panose="020B0604020202020204" pitchFamily="34" charset="0"/>
         <a:buChar char="•"/>
-        <a:defRPr sz="2070" kern="1200">
+        <a:defRPr sz="4872" kern="1200">
           <a:solidFill>
             <a:schemeClr val="tx1"/>
           </a:solidFill>
@@ -2800,16 +2802,16 @@
           <a:cs typeface="+mn-cs"/>
         </a:defRPr>
       </a:lvl6pPr>
-      <a:lvl7pPr marL="3417570" indent="-262890" algn="l" defTabSz="1051560" rtl="0" eaLnBrk="1" latinLnBrk="0" hangingPunct="1">
+      <a:lvl7pPr marL="8043771" indent="-618752" algn="l" defTabSz="2475006" rtl="0" eaLnBrk="1" latinLnBrk="0" hangingPunct="1">
         <a:lnSpc>
           <a:spcPct val="90000"/>
         </a:lnSpc>
         <a:spcBef>
-          <a:spcPts val="575"/>
+          <a:spcPts val="1353"/>
         </a:spcBef>
         <a:buFont typeface="Arial" panose="020B0604020202020204" pitchFamily="34" charset="0"/>
         <a:buChar char="•"/>
-        <a:defRPr sz="2070" kern="1200">
+        <a:defRPr sz="4872" kern="1200">
           <a:solidFill>
             <a:schemeClr val="tx1"/>
           </a:solidFill>
@@ -2818,16 +2820,16 @@
           <a:cs typeface="+mn-cs"/>
         </a:defRPr>
       </a:lvl7pPr>
-      <a:lvl8pPr marL="3943350" indent="-262890" algn="l" defTabSz="1051560" rtl="0" eaLnBrk="1" latinLnBrk="0" hangingPunct="1">
+      <a:lvl8pPr marL="9281274" indent="-618752" algn="l" defTabSz="2475006" rtl="0" eaLnBrk="1" latinLnBrk="0" hangingPunct="1">
         <a:lnSpc>
           <a:spcPct val="90000"/>
         </a:lnSpc>
         <a:spcBef>
-          <a:spcPts val="575"/>
+          <a:spcPts val="1353"/>
         </a:spcBef>
         <a:buFont typeface="Arial" panose="020B0604020202020204" pitchFamily="34" charset="0"/>
         <a:buChar char="•"/>
-        <a:defRPr sz="2070" kern="1200">
+        <a:defRPr sz="4872" kern="1200">
           <a:solidFill>
             <a:schemeClr val="tx1"/>
           </a:solidFill>
@@ -2836,16 +2838,16 @@
           <a:cs typeface="+mn-cs"/>
         </a:defRPr>
       </a:lvl8pPr>
-      <a:lvl9pPr marL="4469130" indent="-262890" algn="l" defTabSz="1051560" rtl="0" eaLnBrk="1" latinLnBrk="0" hangingPunct="1">
+      <a:lvl9pPr marL="10518778" indent="-618752" algn="l" defTabSz="2475006" rtl="0" eaLnBrk="1" latinLnBrk="0" hangingPunct="1">
         <a:lnSpc>
           <a:spcPct val="90000"/>
         </a:lnSpc>
         <a:spcBef>
-          <a:spcPts val="575"/>
+          <a:spcPts val="1353"/>
         </a:spcBef>
         <a:buFont typeface="Arial" panose="020B0604020202020204" pitchFamily="34" charset="0"/>
         <a:buChar char="•"/>
-        <a:defRPr sz="2070" kern="1200">
+        <a:defRPr sz="4872" kern="1200">
           <a:solidFill>
             <a:schemeClr val="tx1"/>
           </a:solidFill>
@@ -2859,8 +2861,8 @@
       <a:defPPr>
         <a:defRPr lang="en-US"/>
       </a:defPPr>
-      <a:lvl1pPr marL="0" algn="l" defTabSz="1051560" rtl="0" eaLnBrk="1" latinLnBrk="0" hangingPunct="1">
-        <a:defRPr sz="2070" kern="1200">
+      <a:lvl1pPr marL="0" algn="l" defTabSz="2475006" rtl="0" eaLnBrk="1" latinLnBrk="0" hangingPunct="1">
+        <a:defRPr sz="4872" kern="1200">
           <a:solidFill>
             <a:schemeClr val="tx1"/>
           </a:solidFill>
@@ -2869,8 +2871,8 @@
           <a:cs typeface="+mn-cs"/>
         </a:defRPr>
       </a:lvl1pPr>
-      <a:lvl2pPr marL="525780" algn="l" defTabSz="1051560" rtl="0" eaLnBrk="1" latinLnBrk="0" hangingPunct="1">
-        <a:defRPr sz="2070" kern="1200">
+      <a:lvl2pPr marL="1237503" algn="l" defTabSz="2475006" rtl="0" eaLnBrk="1" latinLnBrk="0" hangingPunct="1">
+        <a:defRPr sz="4872" kern="1200">
           <a:solidFill>
             <a:schemeClr val="tx1"/>
           </a:solidFill>
@@ -2879,8 +2881,8 @@
           <a:cs typeface="+mn-cs"/>
         </a:defRPr>
       </a:lvl2pPr>
-      <a:lvl3pPr marL="1051560" algn="l" defTabSz="1051560" rtl="0" eaLnBrk="1" latinLnBrk="0" hangingPunct="1">
-        <a:defRPr sz="2070" kern="1200">
+      <a:lvl3pPr marL="2475006" algn="l" defTabSz="2475006" rtl="0" eaLnBrk="1" latinLnBrk="0" hangingPunct="1">
+        <a:defRPr sz="4872" kern="1200">
           <a:solidFill>
             <a:schemeClr val="tx1"/>
           </a:solidFill>
@@ -2889,8 +2891,8 @@
           <a:cs typeface="+mn-cs"/>
         </a:defRPr>
       </a:lvl3pPr>
-      <a:lvl4pPr marL="1577340" algn="l" defTabSz="1051560" rtl="0" eaLnBrk="1" latinLnBrk="0" hangingPunct="1">
-        <a:defRPr sz="2070" kern="1200">
+      <a:lvl4pPr marL="3712510" algn="l" defTabSz="2475006" rtl="0" eaLnBrk="1" latinLnBrk="0" hangingPunct="1">
+        <a:defRPr sz="4872" kern="1200">
           <a:solidFill>
             <a:schemeClr val="tx1"/>
           </a:solidFill>
@@ -2899,8 +2901,8 @@
           <a:cs typeface="+mn-cs"/>
         </a:defRPr>
       </a:lvl4pPr>
-      <a:lvl5pPr marL="2103120" algn="l" defTabSz="1051560" rtl="0" eaLnBrk="1" latinLnBrk="0" hangingPunct="1">
-        <a:defRPr sz="2070" kern="1200">
+      <a:lvl5pPr marL="4950013" algn="l" defTabSz="2475006" rtl="0" eaLnBrk="1" latinLnBrk="0" hangingPunct="1">
+        <a:defRPr sz="4872" kern="1200">
           <a:solidFill>
             <a:schemeClr val="tx1"/>
           </a:solidFill>
@@ -2909,8 +2911,8 @@
           <a:cs typeface="+mn-cs"/>
         </a:defRPr>
       </a:lvl5pPr>
-      <a:lvl6pPr marL="2628900" algn="l" defTabSz="1051560" rtl="0" eaLnBrk="1" latinLnBrk="0" hangingPunct="1">
-        <a:defRPr sz="2070" kern="1200">
+      <a:lvl6pPr marL="6187516" algn="l" defTabSz="2475006" rtl="0" eaLnBrk="1" latinLnBrk="0" hangingPunct="1">
+        <a:defRPr sz="4872" kern="1200">
           <a:solidFill>
             <a:schemeClr val="tx1"/>
           </a:solidFill>
@@ -2919,8 +2921,8 @@
           <a:cs typeface="+mn-cs"/>
         </a:defRPr>
       </a:lvl6pPr>
-      <a:lvl7pPr marL="3154680" algn="l" defTabSz="1051560" rtl="0" eaLnBrk="1" latinLnBrk="0" hangingPunct="1">
-        <a:defRPr sz="2070" kern="1200">
+      <a:lvl7pPr marL="7425019" algn="l" defTabSz="2475006" rtl="0" eaLnBrk="1" latinLnBrk="0" hangingPunct="1">
+        <a:defRPr sz="4872" kern="1200">
           <a:solidFill>
             <a:schemeClr val="tx1"/>
           </a:solidFill>
@@ -2929,8 +2931,8 @@
           <a:cs typeface="+mn-cs"/>
         </a:defRPr>
       </a:lvl7pPr>
-      <a:lvl8pPr marL="3680460" algn="l" defTabSz="1051560" rtl="0" eaLnBrk="1" latinLnBrk="0" hangingPunct="1">
-        <a:defRPr sz="2070" kern="1200">
+      <a:lvl8pPr marL="8662523" algn="l" defTabSz="2475006" rtl="0" eaLnBrk="1" latinLnBrk="0" hangingPunct="1">
+        <a:defRPr sz="4872" kern="1200">
           <a:solidFill>
             <a:schemeClr val="tx1"/>
           </a:solidFill>
@@ -2939,8 +2941,8 @@
           <a:cs typeface="+mn-cs"/>
         </a:defRPr>
       </a:lvl8pPr>
-      <a:lvl9pPr marL="4206240" algn="l" defTabSz="1051560" rtl="0" eaLnBrk="1" latinLnBrk="0" hangingPunct="1">
-        <a:defRPr sz="2070" kern="1200">
+      <a:lvl9pPr marL="9900026" algn="l" defTabSz="2475006" rtl="0" eaLnBrk="1" latinLnBrk="0" hangingPunct="1">
+        <a:defRPr sz="4872" kern="1200">
           <a:solidFill>
             <a:schemeClr val="tx1"/>
           </a:solidFill>
@@ -2992,39 +2994,9 @@
           </a:stretch>
         </p:blipFill>
         <p:spPr>
-          <a:xfrm rot="5400000">
-            <a:off x="-4023520" y="4023519"/>
-            <a:ext cx="18562638" cy="10515600"/>
-          </a:xfrm>
-          <a:prstGeom prst="rect">
-            <a:avLst/>
-          </a:prstGeom>
-        </p:spPr>
-      </p:pic>
-      <p:pic>
-        <p:nvPicPr>
-          <p:cNvPr id="5" name="Picture 4"/>
-          <p:cNvPicPr>
-            <a:picLocks noChangeAspect="1"/>
-          </p:cNvPicPr>
-          <p:nvPr/>
-        </p:nvPicPr>
-        <p:blipFill>
-          <a:blip r:embed="rId3" cstate="print">
-            <a:extLst>
-              <a:ext uri="{28A0092B-C50C-407E-A947-70E740481C1C}">
-                <a14:useLocalDpi xmlns:a14="http://schemas.microsoft.com/office/drawing/2010/main" val="0"/>
-              </a:ext>
-            </a:extLst>
-          </a:blip>
-          <a:stretch>
-            <a:fillRect/>
-          </a:stretch>
-        </p:blipFill>
-        <p:spPr>
           <a:xfrm>
-            <a:off x="9198199" y="223333"/>
-            <a:ext cx="1064993" cy="1064993"/>
+            <a:off x="0" y="-1"/>
+            <a:ext cx="33000950" cy="18694799"/>
           </a:xfrm>
           <a:prstGeom prst="rect">
             <a:avLst/>
@@ -3041,6 +3013,13 @@
   <p:clrMapOvr>
     <a:masterClrMapping/>
   </p:clrMapOvr>
+  <p:timing>
+    <p:tnLst>
+      <p:par>
+        <p:cTn id="1" dur="indefinite" restart="never" nodeType="tmRoot"/>
+      </p:par>
+    </p:tnLst>
+  </p:timing>
 </p:sld>
 </file>
 

</xml_diff>